<commit_message>
Added slide about C# 8 Nullable Reference Types
</commit_message>
<xml_diff>
--- a/Open Source with Dotnet.pptx
+++ b/Open Source with Dotnet.pptx
@@ -5,7 +5,7 @@
     <p:sldMasterId id="2147483648" r:id="rId1"/>
   </p:sldMasterIdLst>
   <p:notesMasterIdLst>
-    <p:notesMasterId r:id="rId40"/>
+    <p:notesMasterId r:id="rId41"/>
   </p:notesMasterIdLst>
   <p:sldIdLst>
     <p:sldId id="256" r:id="rId2"/>
@@ -28,24 +28,25 @@
     <p:sldId id="280" r:id="rId19"/>
     <p:sldId id="281" r:id="rId20"/>
     <p:sldId id="282" r:id="rId21"/>
-    <p:sldId id="283" r:id="rId22"/>
-    <p:sldId id="284" r:id="rId23"/>
-    <p:sldId id="285" r:id="rId24"/>
-    <p:sldId id="286" r:id="rId25"/>
-    <p:sldId id="273" r:id="rId26"/>
-    <p:sldId id="288" r:id="rId27"/>
-    <p:sldId id="287" r:id="rId28"/>
-    <p:sldId id="289" r:id="rId29"/>
-    <p:sldId id="290" r:id="rId30"/>
-    <p:sldId id="261" r:id="rId31"/>
-    <p:sldId id="262" r:id="rId32"/>
-    <p:sldId id="263" r:id="rId33"/>
-    <p:sldId id="264" r:id="rId34"/>
-    <p:sldId id="265" r:id="rId35"/>
-    <p:sldId id="266" r:id="rId36"/>
-    <p:sldId id="291" r:id="rId37"/>
-    <p:sldId id="292" r:id="rId38"/>
-    <p:sldId id="293" r:id="rId39"/>
+    <p:sldId id="294" r:id="rId22"/>
+    <p:sldId id="283" r:id="rId23"/>
+    <p:sldId id="284" r:id="rId24"/>
+    <p:sldId id="285" r:id="rId25"/>
+    <p:sldId id="286" r:id="rId26"/>
+    <p:sldId id="273" r:id="rId27"/>
+    <p:sldId id="288" r:id="rId28"/>
+    <p:sldId id="287" r:id="rId29"/>
+    <p:sldId id="289" r:id="rId30"/>
+    <p:sldId id="290" r:id="rId31"/>
+    <p:sldId id="261" r:id="rId32"/>
+    <p:sldId id="262" r:id="rId33"/>
+    <p:sldId id="263" r:id="rId34"/>
+    <p:sldId id="264" r:id="rId35"/>
+    <p:sldId id="265" r:id="rId36"/>
+    <p:sldId id="266" r:id="rId37"/>
+    <p:sldId id="291" r:id="rId38"/>
+    <p:sldId id="292" r:id="rId39"/>
+    <p:sldId id="293" r:id="rId40"/>
   </p:sldIdLst>
   <p:sldSz cx="12192000" cy="6858000"/>
   <p:notesSz cx="6858000" cy="9144000"/>
@@ -5518,7 +5519,7 @@
           <a:p>
             <a:fld id="{588181D3-5A26-4341-A76D-A589AD088889}" type="datetimeFigureOut">
               <a:rPr lang="de-DE" smtClean="0"/>
-              <a:t>09.12.2018</a:t>
+              <a:t>10.12.2018</a:t>
             </a:fld>
             <a:endParaRPr lang="de-DE"/>
           </a:p>
@@ -16521,13 +16522,13 @@
   <p:clrMapOvr>
     <a:masterClrMapping/>
   </p:clrMapOvr>
-  <mc:AlternateContent xmlns:mc="http://schemas.openxmlformats.org/markup-compatibility/2006">
-    <mc:Choice xmlns:p14="http://schemas.microsoft.com/office/powerpoint/2010/main" Requires="p14">
+  <mc:AlternateContent xmlns:mc="http://schemas.openxmlformats.org/markup-compatibility/2006" xmlns:p14="http://schemas.microsoft.com/office/powerpoint/2010/main">
+    <mc:Choice Requires="p14">
       <p:transition spd="med" p14:dur="700">
         <p:fade/>
       </p:transition>
     </mc:Choice>
-    <mc:Fallback>
+    <mc:Fallback xmlns="">
       <p:transition spd="med">
         <p:fade/>
       </p:transition>
@@ -16827,13 +16828,13 @@
   <p:clrMapOvr>
     <a:masterClrMapping/>
   </p:clrMapOvr>
-  <mc:AlternateContent xmlns:mc="http://schemas.openxmlformats.org/markup-compatibility/2006">
-    <mc:Choice xmlns:p14="http://schemas.microsoft.com/office/powerpoint/2010/main" Requires="p14">
+  <mc:AlternateContent xmlns:mc="http://schemas.openxmlformats.org/markup-compatibility/2006" xmlns:p14="http://schemas.microsoft.com/office/powerpoint/2010/main">
+    <mc:Choice Requires="p14">
       <p:transition spd="med" p14:dur="700">
         <p:fade/>
       </p:transition>
     </mc:Choice>
-    <mc:Fallback>
+    <mc:Fallback xmlns="">
       <p:transition spd="med">
         <p:fade/>
       </p:transition>
@@ -16956,9 +16957,18 @@
             </a:r>
           </a:p>
           <a:p>
+            <a:pPr marL="0" indent="0">
+              <a:buNone/>
+            </a:pPr>
+            <a:endParaRPr lang="de-DE" dirty="0"/>
+          </a:p>
+          <a:p>
+            <a:pPr marL="0" indent="0">
+              <a:buNone/>
+            </a:pPr>
             <a:r>
               <a:rPr lang="de-DE" dirty="0"/>
-              <a:t>Eure Fragen</a:t>
+              <a:t>Zwischenfragen und Anmerkungen erlaubt!</a:t>
             </a:r>
           </a:p>
         </p:txBody>
@@ -17267,6 +17277,188 @@
           <p:cNvPr id="2" name="Title 1">
             <a:extLst>
               <a:ext uri="{FF2B5EF4-FFF2-40B4-BE49-F238E27FC236}">
+                <a16:creationId xmlns:a16="http://schemas.microsoft.com/office/drawing/2014/main" id="{121C4CB0-F2E3-4FDE-A4C1-ACF7673C19C8}"/>
+              </a:ext>
+            </a:extLst>
+          </p:cNvPr>
+          <p:cNvSpPr>
+            <a:spLocks noGrp="1"/>
+          </p:cNvSpPr>
+          <p:nvPr>
+            <p:ph type="title"/>
+          </p:nvPr>
+        </p:nvSpPr>
+        <p:spPr/>
+        <p:txBody>
+          <a:bodyPr/>
+          <a:lstStyle/>
+          <a:p>
+            <a:r>
+              <a:rPr lang="en-US" dirty="0"/>
+              <a:t>Nullable Reference Types</a:t>
+            </a:r>
+            <a:r>
+              <a:rPr lang="de-DE" dirty="0"/>
+              <a:t> in C# 8</a:t>
+            </a:r>
+          </a:p>
+        </p:txBody>
+      </p:sp>
+      <p:pic>
+        <p:nvPicPr>
+          <p:cNvPr id="7" name="Content Placeholder 6">
+            <a:extLst>
+              <a:ext uri="{FF2B5EF4-FFF2-40B4-BE49-F238E27FC236}">
+                <a16:creationId xmlns:a16="http://schemas.microsoft.com/office/drawing/2014/main" id="{F3F0E3BB-36EE-42F0-903E-F2DA30F76269}"/>
+              </a:ext>
+            </a:extLst>
+          </p:cNvPr>
+          <p:cNvPicPr>
+            <a:picLocks noGrp="1" noChangeAspect="1"/>
+          </p:cNvPicPr>
+          <p:nvPr>
+            <p:ph idx="1"/>
+          </p:nvPr>
+        </p:nvPicPr>
+        <p:blipFill>
+          <a:blip r:embed="rId2"/>
+          <a:stretch>
+            <a:fillRect/>
+          </a:stretch>
+        </p:blipFill>
+        <p:spPr>
+          <a:xfrm>
+            <a:off x="3119437" y="1323975"/>
+            <a:ext cx="5953125" cy="4552950"/>
+          </a:xfrm>
+          <a:prstGeom prst="rect">
+            <a:avLst/>
+          </a:prstGeom>
+        </p:spPr>
+      </p:pic>
+      <p:sp>
+        <p:nvSpPr>
+          <p:cNvPr id="4" name="Date Placeholder 3">
+            <a:extLst>
+              <a:ext uri="{FF2B5EF4-FFF2-40B4-BE49-F238E27FC236}">
+                <a16:creationId xmlns:a16="http://schemas.microsoft.com/office/drawing/2014/main" id="{8FCC94E1-AEB5-4520-A009-2B9617CF69BE}"/>
+              </a:ext>
+            </a:extLst>
+          </p:cNvPr>
+          <p:cNvSpPr>
+            <a:spLocks noGrp="1"/>
+          </p:cNvSpPr>
+          <p:nvPr>
+            <p:ph type="dt" sz="half" idx="10"/>
+          </p:nvPr>
+        </p:nvSpPr>
+        <p:spPr/>
+        <p:txBody>
+          <a:bodyPr/>
+          <a:lstStyle/>
+          <a:p>
+            <a:r>
+              <a:rPr lang="de-DE"/>
+              <a:t>10.12.2018</a:t>
+            </a:r>
+          </a:p>
+        </p:txBody>
+      </p:sp>
+      <p:sp>
+        <p:nvSpPr>
+          <p:cNvPr id="5" name="Footer Placeholder 4">
+            <a:extLst>
+              <a:ext uri="{FF2B5EF4-FFF2-40B4-BE49-F238E27FC236}">
+                <a16:creationId xmlns:a16="http://schemas.microsoft.com/office/drawing/2014/main" id="{E8C0AC4B-ADA8-4BF9-8000-C1B726735E88}"/>
+              </a:ext>
+            </a:extLst>
+          </p:cNvPr>
+          <p:cNvSpPr>
+            <a:spLocks noGrp="1"/>
+          </p:cNvSpPr>
+          <p:nvPr>
+            <p:ph type="ftr" sz="quarter" idx="11"/>
+          </p:nvPr>
+        </p:nvSpPr>
+        <p:spPr/>
+        <p:txBody>
+          <a:bodyPr/>
+          <a:lstStyle/>
+          <a:p>
+            <a:r>
+              <a:rPr lang="de-DE"/>
+              <a:t>Open Source mit .NET</a:t>
+            </a:r>
+          </a:p>
+        </p:txBody>
+      </p:sp>
+      <p:sp>
+        <p:nvSpPr>
+          <p:cNvPr id="6" name="Slide Number Placeholder 5">
+            <a:extLst>
+              <a:ext uri="{FF2B5EF4-FFF2-40B4-BE49-F238E27FC236}">
+                <a16:creationId xmlns:a16="http://schemas.microsoft.com/office/drawing/2014/main" id="{718CE485-6641-4E47-9960-169A46F24FBB}"/>
+              </a:ext>
+            </a:extLst>
+          </p:cNvPr>
+          <p:cNvSpPr>
+            <a:spLocks noGrp="1"/>
+          </p:cNvSpPr>
+          <p:nvPr>
+            <p:ph type="sldNum" sz="quarter" idx="12"/>
+          </p:nvPr>
+        </p:nvSpPr>
+        <p:spPr/>
+        <p:txBody>
+          <a:bodyPr/>
+          <a:lstStyle/>
+          <a:p>
+            <a:fld id="{5A14344A-9BDE-4E14-9F68-42155428760A}" type="slidenum">
+              <a:rPr lang="de-DE" smtClean="0"/>
+              <a:t>21</a:t>
+            </a:fld>
+            <a:endParaRPr lang="de-DE"/>
+          </a:p>
+        </p:txBody>
+      </p:sp>
+    </p:spTree>
+    <p:extLst>
+      <p:ext uri="{BB962C8B-B14F-4D97-AF65-F5344CB8AC3E}">
+        <p14:creationId xmlns:p14="http://schemas.microsoft.com/office/powerpoint/2010/main" val="3836867625"/>
+      </p:ext>
+    </p:extLst>
+  </p:cSld>
+  <p:clrMapOvr>
+    <a:masterClrMapping/>
+  </p:clrMapOvr>
+  <p:transition spd="med">
+    <p:cover/>
+  </p:transition>
+</p:sld>
+</file>
+
+<file path=ppt/slides/slide22.xml><?xml version="1.0" encoding="utf-8"?>
+<p:sld xmlns:a="http://schemas.openxmlformats.org/drawingml/2006/main" xmlns:r="http://schemas.openxmlformats.org/officeDocument/2006/relationships" xmlns:p="http://schemas.openxmlformats.org/presentationml/2006/main">
+  <p:cSld>
+    <p:spTree>
+      <p:nvGrpSpPr>
+        <p:cNvPr id="1" name=""/>
+        <p:cNvGrpSpPr/>
+        <p:nvPr/>
+      </p:nvGrpSpPr>
+      <p:grpSpPr>
+        <a:xfrm>
+          <a:off x="0" y="0"/>
+          <a:ext cx="0" cy="0"/>
+          <a:chOff x="0" y="0"/>
+          <a:chExt cx="0" cy="0"/>
+        </a:xfrm>
+      </p:grpSpPr>
+      <p:sp>
+        <p:nvSpPr>
+          <p:cNvPr id="2" name="Title 1">
+            <a:extLst>
+              <a:ext uri="{FF2B5EF4-FFF2-40B4-BE49-F238E27FC236}">
                 <a16:creationId xmlns:a16="http://schemas.microsoft.com/office/drawing/2014/main" id="{A75BD246-7729-4918-975D-2D08559AF625}"/>
               </a:ext>
             </a:extLst>
@@ -17405,7 +17597,7 @@
           <a:p>
             <a:fld id="{5A14344A-9BDE-4E14-9F68-42155428760A}" type="slidenum">
               <a:rPr lang="de-DE" smtClean="0"/>
-              <a:t>21</a:t>
+              <a:t>22</a:t>
             </a:fld>
             <a:endParaRPr lang="de-DE"/>
           </a:p>
@@ -17427,7 +17619,7 @@
 </p:sld>
 </file>
 
-<file path=ppt/slides/slide22.xml><?xml version="1.0" encoding="utf-8"?>
+<file path=ppt/slides/slide23.xml><?xml version="1.0" encoding="utf-8"?>
 <p:sld xmlns:a="http://schemas.openxmlformats.org/drawingml/2006/main" xmlns:r="http://schemas.openxmlformats.org/officeDocument/2006/relationships" xmlns:p="http://schemas.openxmlformats.org/presentationml/2006/main" showMasterPhAnim="0">
   <p:cSld>
     <p:spTree>
@@ -17551,7 +17743,7 @@
           <a:p>
             <a:fld id="{5A14344A-9BDE-4E14-9F68-42155428760A}" type="slidenum">
               <a:rPr lang="de-DE" smtClean="0"/>
-              <a:t>22</a:t>
+              <a:t>23</a:t>
             </a:fld>
             <a:endParaRPr lang="de-DE"/>
           </a:p>
@@ -18278,7 +18470,7 @@
 </p:sld>
 </file>
 
-<file path=ppt/slides/slide23.xml><?xml version="1.0" encoding="utf-8"?>
+<file path=ppt/slides/slide24.xml><?xml version="1.0" encoding="utf-8"?>
 <p:sld xmlns:a="http://schemas.openxmlformats.org/drawingml/2006/main" xmlns:r="http://schemas.openxmlformats.org/officeDocument/2006/relationships" xmlns:p="http://schemas.openxmlformats.org/presentationml/2006/main">
   <p:cSld>
     <p:spTree>
@@ -18494,7 +18686,7 @@
           <a:p>
             <a:fld id="{5A14344A-9BDE-4E14-9F68-42155428760A}" type="slidenum">
               <a:rPr lang="de-DE" smtClean="0"/>
-              <a:t>23</a:t>
+              <a:t>24</a:t>
             </a:fld>
             <a:endParaRPr lang="de-DE"/>
           </a:p>
@@ -18516,7 +18708,7 @@
 </p:sld>
 </file>
 
-<file path=ppt/slides/slide24.xml><?xml version="1.0" encoding="utf-8"?>
+<file path=ppt/slides/slide25.xml><?xml version="1.0" encoding="utf-8"?>
 <p:sld xmlns:a="http://schemas.openxmlformats.org/drawingml/2006/main" xmlns:r="http://schemas.openxmlformats.org/officeDocument/2006/relationships" xmlns:p="http://schemas.openxmlformats.org/presentationml/2006/main" showMasterPhAnim="0">
   <p:cSld>
     <p:spTree>
@@ -18772,7 +18964,7 @@
             <a:fld id="{5A14344A-9BDE-4E14-9F68-42155428760A}" type="slidenum">
               <a:rPr lang="de-DE" smtClean="0"/>
               <a:pPr/>
-              <a:t>24</a:t>
+              <a:t>25</a:t>
             </a:fld>
             <a:endParaRPr lang="de-DE"/>
           </a:p>
@@ -19020,7 +19212,7 @@
 </p:sld>
 </file>
 
-<file path=ppt/slides/slide25.xml><?xml version="1.0" encoding="utf-8"?>
+<file path=ppt/slides/slide26.xml><?xml version="1.0" encoding="utf-8"?>
 <p:sld xmlns:a="http://schemas.openxmlformats.org/drawingml/2006/main" xmlns:r="http://schemas.openxmlformats.org/officeDocument/2006/relationships" xmlns:p="http://schemas.openxmlformats.org/presentationml/2006/main">
   <p:cSld>
     <p:spTree>
@@ -19144,7 +19336,7 @@
           <a:p>
             <a:fld id="{5A14344A-9BDE-4E14-9F68-42155428760A}" type="slidenum">
               <a:rPr lang="de-DE" smtClean="0"/>
-              <a:t>25</a:t>
+              <a:t>26</a:t>
             </a:fld>
             <a:endParaRPr lang="de-DE"/>
           </a:p>
@@ -19245,7 +19437,7 @@
 </p:sld>
 </file>
 
-<file path=ppt/slides/slide26.xml><?xml version="1.0" encoding="utf-8"?>
+<file path=ppt/slides/slide27.xml><?xml version="1.0" encoding="utf-8"?>
 <p:sld xmlns:a="http://schemas.openxmlformats.org/drawingml/2006/main" xmlns:r="http://schemas.openxmlformats.org/officeDocument/2006/relationships" xmlns:p="http://schemas.openxmlformats.org/presentationml/2006/main">
   <p:cSld>
     <p:spTree>
@@ -19404,7 +19596,7 @@
           <a:p>
             <a:fld id="{5A14344A-9BDE-4E14-9F68-42155428760A}" type="slidenum">
               <a:rPr lang="de-DE" smtClean="0"/>
-              <a:t>26</a:t>
+              <a:t>27</a:t>
             </a:fld>
             <a:endParaRPr lang="de-DE"/>
           </a:p>
@@ -19426,7 +19618,7 @@
 </p:sld>
 </file>
 
-<file path=ppt/slides/slide27.xml><?xml version="1.0" encoding="utf-8"?>
+<file path=ppt/slides/slide28.xml><?xml version="1.0" encoding="utf-8"?>
 <p:sld xmlns:a="http://schemas.openxmlformats.org/drawingml/2006/main" xmlns:r="http://schemas.openxmlformats.org/officeDocument/2006/relationships" xmlns:p="http://schemas.openxmlformats.org/presentationml/2006/main" showMasterPhAnim="0">
   <p:cSld>
     <p:spTree>
@@ -19585,7 +19777,7 @@
           <a:p>
             <a:fld id="{5A14344A-9BDE-4E14-9F68-42155428760A}" type="slidenum">
               <a:rPr lang="de-DE" smtClean="0"/>
-              <a:t>27</a:t>
+              <a:t>28</a:t>
             </a:fld>
             <a:endParaRPr lang="de-DE"/>
           </a:p>
@@ -20051,7 +20243,7 @@
 </p:sld>
 </file>
 
-<file path=ppt/slides/slide28.xml><?xml version="1.0" encoding="utf-8"?>
+<file path=ppt/slides/slide29.xml><?xml version="1.0" encoding="utf-8"?>
 <p:sld xmlns:a="http://schemas.openxmlformats.org/drawingml/2006/main" xmlns:r="http://schemas.openxmlformats.org/officeDocument/2006/relationships" xmlns:p="http://schemas.openxmlformats.org/presentationml/2006/main">
   <p:cSld>
     <p:spTree>
@@ -20210,7 +20402,7 @@
           <a:p>
             <a:fld id="{5A14344A-9BDE-4E14-9F68-42155428760A}" type="slidenum">
               <a:rPr lang="de-DE" smtClean="0"/>
-              <a:t>28</a:t>
+              <a:t>29</a:t>
             </a:fld>
             <a:endParaRPr lang="de-DE"/>
           </a:p>
@@ -20220,310 +20412,6 @@
     <p:extLst>
       <p:ext uri="{BB962C8B-B14F-4D97-AF65-F5344CB8AC3E}">
         <p14:creationId xmlns:p14="http://schemas.microsoft.com/office/powerpoint/2010/main" val="509368563"/>
-      </p:ext>
-    </p:extLst>
-  </p:cSld>
-  <p:clrMapOvr>
-    <a:masterClrMapping/>
-  </p:clrMapOvr>
-  <p:transition spd="med">
-    <p:cover/>
-  </p:transition>
-</p:sld>
-</file>
-
-<file path=ppt/slides/slide29.xml><?xml version="1.0" encoding="utf-8"?>
-<p:sld xmlns:a="http://schemas.openxmlformats.org/drawingml/2006/main" xmlns:r="http://schemas.openxmlformats.org/officeDocument/2006/relationships" xmlns:p="http://schemas.openxmlformats.org/presentationml/2006/main">
-  <p:cSld>
-    <p:spTree>
-      <p:nvGrpSpPr>
-        <p:cNvPr id="1" name=""/>
-        <p:cNvGrpSpPr/>
-        <p:nvPr/>
-      </p:nvGrpSpPr>
-      <p:grpSpPr>
-        <a:xfrm>
-          <a:off x="0" y="0"/>
-          <a:ext cx="0" cy="0"/>
-          <a:chOff x="0" y="0"/>
-          <a:chExt cx="0" cy="0"/>
-        </a:xfrm>
-      </p:grpSpPr>
-      <p:sp>
-        <p:nvSpPr>
-          <p:cNvPr id="2" name="Title 1">
-            <a:extLst>
-              <a:ext uri="{FF2B5EF4-FFF2-40B4-BE49-F238E27FC236}">
-                <a16:creationId xmlns:a16="http://schemas.microsoft.com/office/drawing/2014/main" id="{AC342213-BFA1-456B-B4F9-033B07AC61D4}"/>
-              </a:ext>
-            </a:extLst>
-          </p:cNvPr>
-          <p:cNvSpPr>
-            <a:spLocks noGrp="1"/>
-          </p:cNvSpPr>
-          <p:nvPr>
-            <p:ph type="title"/>
-          </p:nvPr>
-        </p:nvSpPr>
-        <p:spPr/>
-        <p:txBody>
-          <a:bodyPr/>
-          <a:lstStyle/>
-          <a:p>
-            <a:r>
-              <a:rPr lang="de-DE" dirty="0"/>
-              <a:t>Zusammenfassung Performanceoptimierung</a:t>
-            </a:r>
-          </a:p>
-        </p:txBody>
-      </p:sp>
-      <p:sp>
-        <p:nvSpPr>
-          <p:cNvPr id="3" name="Content Placeholder 2">
-            <a:extLst>
-              <a:ext uri="{FF2B5EF4-FFF2-40B4-BE49-F238E27FC236}">
-                <a16:creationId xmlns:a16="http://schemas.microsoft.com/office/drawing/2014/main" id="{FADBF800-02AD-42AC-B448-7FAD55329726}"/>
-              </a:ext>
-            </a:extLst>
-          </p:cNvPr>
-          <p:cNvSpPr>
-            <a:spLocks noGrp="1"/>
-          </p:cNvSpPr>
-          <p:nvPr>
-            <p:ph idx="1"/>
-          </p:nvPr>
-        </p:nvSpPr>
-        <p:spPr/>
-        <p:txBody>
-          <a:bodyPr/>
-          <a:lstStyle/>
-          <a:p>
-            <a:r>
-              <a:rPr lang="de-DE" dirty="0"/>
-              <a:t>Ziele setzen und messen</a:t>
-            </a:r>
-          </a:p>
-          <a:p>
-            <a:r>
-              <a:rPr lang="de-DE" dirty="0"/>
-              <a:t>Die Interna verstehen (CLR, Memory Management, Computerarchitektur)</a:t>
-            </a:r>
-          </a:p>
-          <a:p>
-            <a:endParaRPr lang="de-DE" dirty="0"/>
-          </a:p>
-          <a:p>
-            <a:pPr marL="0" indent="0">
-              <a:buNone/>
-            </a:pPr>
-            <a:r>
-              <a:rPr lang="de-DE" dirty="0"/>
-              <a:t>Weiterführende Quellen:</a:t>
-            </a:r>
-          </a:p>
-          <a:p>
-            <a:pPr marL="0" indent="0">
-              <a:buNone/>
-            </a:pPr>
-            <a:r>
-              <a:rPr lang="de-DE" dirty="0"/>
-              <a:t>[1] – </a:t>
-            </a:r>
-            <a:r>
-              <a:rPr lang="en-US" dirty="0">
-                <a:hlinkClick r:id="rId2"/>
-              </a:rPr>
-              <a:t>Pro .NET Memory Management – Konrad </a:t>
-            </a:r>
-            <a:r>
-              <a:rPr lang="en-US" dirty="0" err="1">
-                <a:hlinkClick r:id="rId2"/>
-              </a:rPr>
-              <a:t>Kokosa</a:t>
-            </a:r>
-            <a:r>
-              <a:rPr lang="en-US" dirty="0">
-                <a:hlinkClick r:id="rId2"/>
-              </a:rPr>
-              <a:t>, </a:t>
-            </a:r>
-            <a:r>
-              <a:rPr lang="en-US" dirty="0" err="1">
-                <a:hlinkClick r:id="rId2"/>
-              </a:rPr>
-              <a:t>Apress</a:t>
-            </a:r>
-            <a:r>
-              <a:rPr lang="en-US" dirty="0">
-                <a:hlinkClick r:id="rId2"/>
-              </a:rPr>
-              <a:t> Media, 2018</a:t>
-            </a:r>
-            <a:endParaRPr lang="de-DE" dirty="0"/>
-          </a:p>
-          <a:p>
-            <a:pPr marL="0" indent="0">
-              <a:buNone/>
-            </a:pPr>
-            <a:r>
-              <a:rPr lang="de-DE" dirty="0"/>
-              <a:t>[2] – </a:t>
-            </a:r>
-            <a:r>
-              <a:rPr lang="de-DE" dirty="0">
-                <a:hlinkClick r:id="rId3"/>
-              </a:rPr>
-              <a:t>Writing High-Performance .NET Code – Ben Watson, 2018</a:t>
-            </a:r>
-            <a:endParaRPr lang="de-DE" dirty="0"/>
-          </a:p>
-          <a:p>
-            <a:pPr marL="0" indent="0">
-              <a:buNone/>
-            </a:pPr>
-            <a:r>
-              <a:rPr lang="de-DE" dirty="0"/>
-              <a:t>[3] – </a:t>
-            </a:r>
-            <a:r>
-              <a:rPr lang="de-DE" dirty="0">
-                <a:hlinkClick r:id="rId4"/>
-              </a:rPr>
-              <a:t>Benchmark.NET</a:t>
-            </a:r>
-            <a:endParaRPr lang="de-DE" dirty="0"/>
-          </a:p>
-          <a:p>
-            <a:pPr marL="0" indent="0">
-              <a:buNone/>
-            </a:pPr>
-            <a:r>
-              <a:rPr lang="de-DE" dirty="0"/>
-              <a:t>[4] – </a:t>
-            </a:r>
-            <a:r>
-              <a:rPr lang="de-DE" dirty="0" err="1">
-                <a:hlinkClick r:id="rId5"/>
-              </a:rPr>
-              <a:t>Awesome</a:t>
-            </a:r>
-            <a:r>
-              <a:rPr lang="de-DE" dirty="0">
-                <a:hlinkClick r:id="rId5"/>
-              </a:rPr>
-              <a:t> .NET Performance – Adam </a:t>
-            </a:r>
-            <a:r>
-              <a:rPr lang="de-DE" dirty="0" err="1">
-                <a:hlinkClick r:id="rId5"/>
-              </a:rPr>
-              <a:t>Sitnik</a:t>
-            </a:r>
-            <a:r>
-              <a:rPr lang="de-DE" dirty="0">
-                <a:hlinkClick r:id="rId5"/>
-              </a:rPr>
-              <a:t>, GitHub</a:t>
-            </a:r>
-            <a:endParaRPr lang="de-DE" dirty="0"/>
-          </a:p>
-          <a:p>
-            <a:endParaRPr lang="de-DE" dirty="0"/>
-          </a:p>
-          <a:p>
-            <a:endParaRPr lang="de-DE" dirty="0"/>
-          </a:p>
-        </p:txBody>
-      </p:sp>
-      <p:sp>
-        <p:nvSpPr>
-          <p:cNvPr id="4" name="Date Placeholder 3">
-            <a:extLst>
-              <a:ext uri="{FF2B5EF4-FFF2-40B4-BE49-F238E27FC236}">
-                <a16:creationId xmlns:a16="http://schemas.microsoft.com/office/drawing/2014/main" id="{4BEEB0DC-71F7-4993-BDCD-CD0E4AAAA6CE}"/>
-              </a:ext>
-            </a:extLst>
-          </p:cNvPr>
-          <p:cNvSpPr>
-            <a:spLocks noGrp="1"/>
-          </p:cNvSpPr>
-          <p:nvPr>
-            <p:ph type="dt" sz="half" idx="10"/>
-          </p:nvPr>
-        </p:nvSpPr>
-        <p:spPr/>
-        <p:txBody>
-          <a:bodyPr/>
-          <a:lstStyle/>
-          <a:p>
-            <a:r>
-              <a:rPr lang="de-DE"/>
-              <a:t>10.12.2018</a:t>
-            </a:r>
-          </a:p>
-        </p:txBody>
-      </p:sp>
-      <p:sp>
-        <p:nvSpPr>
-          <p:cNvPr id="5" name="Footer Placeholder 4">
-            <a:extLst>
-              <a:ext uri="{FF2B5EF4-FFF2-40B4-BE49-F238E27FC236}">
-                <a16:creationId xmlns:a16="http://schemas.microsoft.com/office/drawing/2014/main" id="{3F0BF09F-1FE1-48FB-AF17-3A134DB31B74}"/>
-              </a:ext>
-            </a:extLst>
-          </p:cNvPr>
-          <p:cNvSpPr>
-            <a:spLocks noGrp="1"/>
-          </p:cNvSpPr>
-          <p:nvPr>
-            <p:ph type="ftr" sz="quarter" idx="11"/>
-          </p:nvPr>
-        </p:nvSpPr>
-        <p:spPr/>
-        <p:txBody>
-          <a:bodyPr/>
-          <a:lstStyle/>
-          <a:p>
-            <a:r>
-              <a:rPr lang="de-DE"/>
-              <a:t>Open Source mit .NET</a:t>
-            </a:r>
-          </a:p>
-        </p:txBody>
-      </p:sp>
-      <p:sp>
-        <p:nvSpPr>
-          <p:cNvPr id="6" name="Slide Number Placeholder 5">
-            <a:extLst>
-              <a:ext uri="{FF2B5EF4-FFF2-40B4-BE49-F238E27FC236}">
-                <a16:creationId xmlns:a16="http://schemas.microsoft.com/office/drawing/2014/main" id="{AFCEF63E-FAD6-4519-9502-11DE1E38FA55}"/>
-              </a:ext>
-            </a:extLst>
-          </p:cNvPr>
-          <p:cNvSpPr>
-            <a:spLocks noGrp="1"/>
-          </p:cNvSpPr>
-          <p:nvPr>
-            <p:ph type="sldNum" sz="quarter" idx="12"/>
-          </p:nvPr>
-        </p:nvSpPr>
-        <p:spPr/>
-        <p:txBody>
-          <a:bodyPr/>
-          <a:lstStyle/>
-          <a:p>
-            <a:fld id="{5A14344A-9BDE-4E14-9F68-42155428760A}" type="slidenum">
-              <a:rPr lang="de-DE" smtClean="0"/>
-              <a:t>29</a:t>
-            </a:fld>
-            <a:endParaRPr lang="de-DE"/>
-          </a:p>
-        </p:txBody>
-      </p:sp>
-    </p:spTree>
-    <p:extLst>
-      <p:ext uri="{BB962C8B-B14F-4D97-AF65-F5344CB8AC3E}">
-        <p14:creationId xmlns:p14="http://schemas.microsoft.com/office/powerpoint/2010/main" val="1055941745"/>
       </p:ext>
     </p:extLst>
   </p:cSld>
@@ -21233,10 +21121,10 @@
       </p:grpSpPr>
       <p:sp>
         <p:nvSpPr>
-          <p:cNvPr id="7" name="Title 6">
-            <a:extLst>
-              <a:ext uri="{FF2B5EF4-FFF2-40B4-BE49-F238E27FC236}">
-                <a16:creationId xmlns:a16="http://schemas.microsoft.com/office/drawing/2014/main" id="{6CE73DC5-5DAD-474A-9115-9E35DE2F2092}"/>
+          <p:cNvPr id="2" name="Title 1">
+            <a:extLst>
+              <a:ext uri="{FF2B5EF4-FFF2-40B4-BE49-F238E27FC236}">
+                <a16:creationId xmlns:a16="http://schemas.microsoft.com/office/drawing/2014/main" id="{AC342213-BFA1-456B-B4F9-033B07AC61D4}"/>
               </a:ext>
             </a:extLst>
           </p:cNvPr>
@@ -21253,30 +21141,18 @@
           <a:lstStyle/>
           <a:p>
             <a:r>
-              <a:rPr lang="de-DE" noProof="1"/>
-              <a:t>csproj</a:t>
-            </a:r>
-            <a:r>
               <a:rPr lang="de-DE" dirty="0"/>
-              <a:t> mit </a:t>
-            </a:r>
-            <a:r>
-              <a:rPr lang="de-DE" noProof="1"/>
-              <a:t>MSBuild</a:t>
-            </a:r>
-            <a:r>
-              <a:rPr lang="de-DE" dirty="0"/>
-              <a:t> 15</a:t>
-            </a:r>
-          </a:p>
-        </p:txBody>
-      </p:sp>
-      <p:sp>
-        <p:nvSpPr>
-          <p:cNvPr id="8" name="Text Placeholder 7">
-            <a:extLst>
-              <a:ext uri="{FF2B5EF4-FFF2-40B4-BE49-F238E27FC236}">
-                <a16:creationId xmlns:a16="http://schemas.microsoft.com/office/drawing/2014/main" id="{4AA5173F-F780-4E90-9AF9-C5D26C34F4D4}"/>
+              <a:t>Zusammenfassung Performanceoptimierung</a:t>
+            </a:r>
+          </a:p>
+        </p:txBody>
+      </p:sp>
+      <p:sp>
+        <p:nvSpPr>
+          <p:cNvPr id="3" name="Content Placeholder 2">
+            <a:extLst>
+              <a:ext uri="{FF2B5EF4-FFF2-40B4-BE49-F238E27FC236}">
+                <a16:creationId xmlns:a16="http://schemas.microsoft.com/office/drawing/2014/main" id="{FADBF800-02AD-42AC-B448-7FAD55329726}"/>
               </a:ext>
             </a:extLst>
           </p:cNvPr>
@@ -21284,7 +21160,7 @@
             <a:spLocks noGrp="1"/>
           </p:cNvSpPr>
           <p:nvPr>
-            <p:ph type="body" idx="1"/>
+            <p:ph idx="1"/>
           </p:nvPr>
         </p:nvSpPr>
         <p:spPr/>
@@ -21294,8 +21170,138 @@
           <a:p>
             <a:r>
               <a:rPr lang="de-DE" dirty="0"/>
-              <a:t>Grundlagen – Live Demo</a:t>
-            </a:r>
+              <a:t>Ziele setzen und messen</a:t>
+            </a:r>
+          </a:p>
+          <a:p>
+            <a:r>
+              <a:rPr lang="de-DE" dirty="0"/>
+              <a:t>Die Interna verstehen (CLR, Memory Management, Computerarchitektur)</a:t>
+            </a:r>
+          </a:p>
+          <a:p>
+            <a:endParaRPr lang="de-DE" dirty="0"/>
+          </a:p>
+          <a:p>
+            <a:pPr marL="0" indent="0">
+              <a:buNone/>
+            </a:pPr>
+            <a:r>
+              <a:rPr lang="de-DE" dirty="0"/>
+              <a:t>Weiterführende Quellen:</a:t>
+            </a:r>
+          </a:p>
+          <a:p>
+            <a:pPr marL="0" indent="0">
+              <a:buNone/>
+            </a:pPr>
+            <a:r>
+              <a:rPr lang="de-DE" dirty="0"/>
+              <a:t>[1] – </a:t>
+            </a:r>
+            <a:r>
+              <a:rPr lang="en-US" dirty="0">
+                <a:hlinkClick r:id="rId2"/>
+              </a:rPr>
+              <a:t>Pro .NET Memory Management – Konrad </a:t>
+            </a:r>
+            <a:r>
+              <a:rPr lang="en-US" dirty="0" err="1">
+                <a:hlinkClick r:id="rId2"/>
+              </a:rPr>
+              <a:t>Kokosa</a:t>
+            </a:r>
+            <a:r>
+              <a:rPr lang="en-US" dirty="0">
+                <a:hlinkClick r:id="rId2"/>
+              </a:rPr>
+              <a:t>, </a:t>
+            </a:r>
+            <a:r>
+              <a:rPr lang="en-US" dirty="0" err="1">
+                <a:hlinkClick r:id="rId2"/>
+              </a:rPr>
+              <a:t>Apress</a:t>
+            </a:r>
+            <a:r>
+              <a:rPr lang="en-US" dirty="0">
+                <a:hlinkClick r:id="rId2"/>
+              </a:rPr>
+              <a:t> Media, 2018</a:t>
+            </a:r>
+            <a:endParaRPr lang="de-DE" dirty="0"/>
+          </a:p>
+          <a:p>
+            <a:pPr marL="0" indent="0">
+              <a:buNone/>
+            </a:pPr>
+            <a:r>
+              <a:rPr lang="de-DE" dirty="0"/>
+              <a:t>[2] – </a:t>
+            </a:r>
+            <a:r>
+              <a:rPr lang="de-DE" dirty="0">
+                <a:hlinkClick r:id="rId3"/>
+              </a:rPr>
+              <a:t>Writing High-Performance .NET Code – Ben Watson, 2018</a:t>
+            </a:r>
+            <a:endParaRPr lang="de-DE" dirty="0"/>
+          </a:p>
+          <a:p>
+            <a:pPr marL="0" indent="0">
+              <a:buNone/>
+            </a:pPr>
+            <a:r>
+              <a:rPr lang="de-DE" dirty="0"/>
+              <a:t>[3] – </a:t>
+            </a:r>
+            <a:r>
+              <a:rPr lang="de-DE" dirty="0">
+                <a:hlinkClick r:id="rId4"/>
+              </a:rPr>
+              <a:t>Benchmark.NET</a:t>
+            </a:r>
+            <a:endParaRPr lang="de-DE" dirty="0"/>
+          </a:p>
+          <a:p>
+            <a:pPr marL="0" indent="0">
+              <a:buNone/>
+            </a:pPr>
+            <a:r>
+              <a:rPr lang="de-DE" dirty="0"/>
+              <a:t>[4] – </a:t>
+            </a:r>
+            <a:r>
+              <a:rPr lang="de-DE" dirty="0" err="1">
+                <a:hlinkClick r:id="rId5"/>
+              </a:rPr>
+              <a:t>Awesome</a:t>
+            </a:r>
+            <a:r>
+              <a:rPr lang="de-DE" dirty="0">
+                <a:hlinkClick r:id="rId5"/>
+              </a:rPr>
+              <a:t> .NET Performance – Adam </a:t>
+            </a:r>
+            <a:r>
+              <a:rPr lang="de-DE" dirty="0" err="1">
+                <a:hlinkClick r:id="rId5"/>
+              </a:rPr>
+              <a:t>Sitnik</a:t>
+            </a:r>
+            <a:r>
+              <a:rPr lang="de-DE" dirty="0">
+                <a:hlinkClick r:id="rId5"/>
+              </a:rPr>
+              <a:t>, GitHub</a:t>
+            </a:r>
+            <a:endParaRPr lang="de-DE" dirty="0"/>
+          </a:p>
+          <a:p>
+            <a:endParaRPr lang="de-DE" dirty="0"/>
+          </a:p>
+          <a:p>
+            <a:endParaRPr lang="de-DE" dirty="0"/>
           </a:p>
         </p:txBody>
       </p:sp>
@@ -21304,7 +21310,7 @@
           <p:cNvPr id="4" name="Date Placeholder 3">
             <a:extLst>
               <a:ext uri="{FF2B5EF4-FFF2-40B4-BE49-F238E27FC236}">
-                <a16:creationId xmlns:a16="http://schemas.microsoft.com/office/drawing/2014/main" id="{8D163873-DB02-48E1-AF1D-9618B930B46F}"/>
+                <a16:creationId xmlns:a16="http://schemas.microsoft.com/office/drawing/2014/main" id="{4BEEB0DC-71F7-4993-BDCD-CD0E4AAAA6CE}"/>
               </a:ext>
             </a:extLst>
           </p:cNvPr>
@@ -21332,7 +21338,7 @@
           <p:cNvPr id="5" name="Footer Placeholder 4">
             <a:extLst>
               <a:ext uri="{FF2B5EF4-FFF2-40B4-BE49-F238E27FC236}">
-                <a16:creationId xmlns:a16="http://schemas.microsoft.com/office/drawing/2014/main" id="{1CBCA056-A244-4D82-BE96-B5323D74A150}"/>
+                <a16:creationId xmlns:a16="http://schemas.microsoft.com/office/drawing/2014/main" id="{3F0BF09F-1FE1-48FB-AF17-3A134DB31B74}"/>
               </a:ext>
             </a:extLst>
           </p:cNvPr>
@@ -21360,7 +21366,7 @@
           <p:cNvPr id="6" name="Slide Number Placeholder 5">
             <a:extLst>
               <a:ext uri="{FF2B5EF4-FFF2-40B4-BE49-F238E27FC236}">
-                <a16:creationId xmlns:a16="http://schemas.microsoft.com/office/drawing/2014/main" id="{277FC5F9-1D73-4190-B79F-3C1BC6E87F44}"/>
+                <a16:creationId xmlns:a16="http://schemas.microsoft.com/office/drawing/2014/main" id="{AFCEF63E-FAD6-4519-9502-11DE1E38FA55}"/>
               </a:ext>
             </a:extLst>
           </p:cNvPr>
@@ -21387,7 +21393,7 @@
     </p:spTree>
     <p:extLst>
       <p:ext uri="{BB962C8B-B14F-4D97-AF65-F5344CB8AC3E}">
-        <p14:creationId xmlns:p14="http://schemas.microsoft.com/office/powerpoint/2010/main" val="2445126468"/>
+        <p14:creationId xmlns:p14="http://schemas.microsoft.com/office/powerpoint/2010/main" val="1055941745"/>
       </p:ext>
     </p:extLst>
   </p:cSld>
@@ -21422,7 +21428,7 @@
           <p:cNvPr id="7" name="Title 6">
             <a:extLst>
               <a:ext uri="{FF2B5EF4-FFF2-40B4-BE49-F238E27FC236}">
-                <a16:creationId xmlns:a16="http://schemas.microsoft.com/office/drawing/2014/main" id="{9716DFB7-64AC-4A61-A03F-4C7F577F3A0E}"/>
+                <a16:creationId xmlns:a16="http://schemas.microsoft.com/office/drawing/2014/main" id="{6CE73DC5-5DAD-474A-9115-9E35DE2F2092}"/>
               </a:ext>
             </a:extLst>
           </p:cNvPr>
@@ -21439,26 +21445,30 @@
           <a:lstStyle/>
           <a:p>
             <a:r>
+              <a:rPr lang="de-DE" noProof="1"/>
+              <a:t>csproj</a:t>
+            </a:r>
+            <a:r>
               <a:rPr lang="de-DE" dirty="0"/>
-              <a:t>Grundlagen von </a:t>
+              <a:t> mit </a:t>
             </a:r>
             <a:r>
               <a:rPr lang="de-DE" noProof="1"/>
-              <a:t>MSBuild </a:t>
+              <a:t>MSBuild</a:t>
             </a:r>
             <a:r>
               <a:rPr lang="de-DE" dirty="0"/>
-              <a:t>Projektdateien</a:t>
-            </a:r>
-          </a:p>
-        </p:txBody>
-      </p:sp>
-      <p:sp>
-        <p:nvSpPr>
-          <p:cNvPr id="8" name="Content Placeholder 7">
-            <a:extLst>
-              <a:ext uri="{FF2B5EF4-FFF2-40B4-BE49-F238E27FC236}">
-                <a16:creationId xmlns:a16="http://schemas.microsoft.com/office/drawing/2014/main" id="{BC451CD1-1559-459F-AE66-FD33E214B980}"/>
+              <a:t> 15</a:t>
+            </a:r>
+          </a:p>
+        </p:txBody>
+      </p:sp>
+      <p:sp>
+        <p:nvSpPr>
+          <p:cNvPr id="8" name="Text Placeholder 7">
+            <a:extLst>
+              <a:ext uri="{FF2B5EF4-FFF2-40B4-BE49-F238E27FC236}">
+                <a16:creationId xmlns:a16="http://schemas.microsoft.com/office/drawing/2014/main" id="{4AA5173F-F780-4E90-9AF9-C5D26C34F4D4}"/>
               </a:ext>
             </a:extLst>
           </p:cNvPr>
@@ -21466,7 +21476,7 @@
             <a:spLocks noGrp="1"/>
           </p:cNvSpPr>
           <p:nvPr>
-            <p:ph idx="1"/>
+            <p:ph type="body" idx="1"/>
           </p:nvPr>
         </p:nvSpPr>
         <p:spPr/>
@@ -21475,163 +21485,9 @@
           <a:lstStyle/>
           <a:p>
             <a:r>
-              <a:rPr lang="de-DE" noProof="1"/>
-              <a:t>MSBuild</a:t>
-            </a:r>
-            <a:r>
               <a:rPr lang="de-DE" dirty="0"/>
-              <a:t> Projektdateien sind deklarative XML-Dateien.</a:t>
-            </a:r>
-          </a:p>
-          <a:p>
-            <a:r>
-              <a:rPr lang="de-DE" dirty="0"/>
-              <a:t>Das Wurzelelement ist muss &lt;</a:t>
-            </a:r>
-            <a:r>
-              <a:rPr lang="de-DE" dirty="0">
-                <a:latin typeface="Consolas" panose="020B0609020204030204" pitchFamily="49" charset="0"/>
-              </a:rPr>
-              <a:t>Project&gt;</a:t>
-            </a:r>
-            <a:r>
-              <a:rPr lang="de-DE" dirty="0"/>
-              <a:t> heißen.</a:t>
-            </a:r>
-          </a:p>
-          <a:p>
-            <a:r>
-              <a:rPr lang="de-DE" dirty="0"/>
-              <a:t>Darunter kann man folgende Kindelemente setzen:</a:t>
-            </a:r>
-          </a:p>
-          <a:p>
-            <a:pPr lvl="1"/>
-            <a:r>
-              <a:rPr lang="de-DE" dirty="0"/>
-              <a:t>Variablenansammlungen:</a:t>
-            </a:r>
-          </a:p>
-          <a:p>
-            <a:pPr lvl="2"/>
-            <a:r>
-              <a:rPr lang="de-DE" noProof="1">
-                <a:latin typeface="Consolas" panose="020B0609020204030204" pitchFamily="49" charset="0"/>
-              </a:rPr>
-              <a:t>&lt;PropertyGroup&gt;</a:t>
-            </a:r>
-            <a:r>
-              <a:rPr lang="de-DE" dirty="0"/>
-              <a:t> (Variablen mit selben Namen werden ersetzt)</a:t>
-            </a:r>
-          </a:p>
-          <a:p>
-            <a:pPr lvl="2"/>
-            <a:r>
-              <a:rPr lang="de-DE" noProof="1">
-                <a:latin typeface="Consolas" panose="020B0609020204030204" pitchFamily="49" charset="0"/>
-              </a:rPr>
-              <a:t>&lt;ItemGroup&gt;</a:t>
-            </a:r>
-            <a:r>
-              <a:rPr lang="de-DE" dirty="0"/>
-              <a:t> (Variablen mit selben Namen werden in dieselbe Collection geschoben)</a:t>
-            </a:r>
-          </a:p>
-          <a:p>
-            <a:pPr lvl="1"/>
-            <a:r>
-              <a:rPr lang="de-DE" dirty="0">
-                <a:latin typeface="Consolas" panose="020B0609020204030204" pitchFamily="49" charset="0"/>
-              </a:rPr>
-              <a:t>&lt;Target&gt;</a:t>
-            </a:r>
-            <a:r>
-              <a:rPr lang="de-DE" dirty="0"/>
-              <a:t> (Kommandos, die ausgeführt werden von </a:t>
-            </a:r>
-            <a:r>
-              <a:rPr lang="de-DE" noProof="1"/>
-              <a:t>MSBuild</a:t>
-            </a:r>
-            <a:r>
-              <a:rPr lang="de-DE" dirty="0"/>
-              <a:t>)</a:t>
-            </a:r>
-          </a:p>
-          <a:p>
-            <a:pPr lvl="1"/>
-            <a:r>
-              <a:rPr lang="de-DE" dirty="0">
-                <a:latin typeface="Consolas" panose="020B0609020204030204" pitchFamily="49" charset="0"/>
-              </a:rPr>
-              <a:t>&lt;Import&gt;</a:t>
-            </a:r>
-            <a:r>
-              <a:rPr lang="de-DE" dirty="0"/>
-              <a:t> (Einbinden anderer </a:t>
-            </a:r>
-            <a:r>
-              <a:rPr lang="de-DE" noProof="1"/>
-              <a:t>MSBuild</a:t>
-            </a:r>
-            <a:r>
-              <a:rPr lang="de-DE" dirty="0"/>
-              <a:t> Projektdateien</a:t>
-            </a:r>
-          </a:p>
-          <a:p>
-            <a:r>
-              <a:rPr lang="de-DE" dirty="0"/>
-              <a:t>Auf jedem Element kann eine </a:t>
-            </a:r>
-            <a:r>
-              <a:rPr lang="de-DE" noProof="1">
-                <a:latin typeface="Consolas" panose="020B0609020204030204" pitchFamily="49" charset="0"/>
-              </a:rPr>
-              <a:t>&lt;Condition&gt;</a:t>
-            </a:r>
-            <a:r>
-              <a:rPr lang="de-DE" dirty="0"/>
-              <a:t> gesetzt werden. Sie entsprechen einer </a:t>
-            </a:r>
-            <a:r>
-              <a:rPr lang="de-DE" dirty="0" err="1"/>
-              <a:t>If</a:t>
-            </a:r>
-            <a:r>
-              <a:rPr lang="de-DE" dirty="0"/>
-              <a:t>-Abfrage und in ihnen werden üblicherweise bestimmte Variablenwerte geprüft.</a:t>
-            </a:r>
-            <a:br>
-              <a:rPr lang="de-DE" dirty="0"/>
-            </a:br>
-            <a:r>
-              <a:rPr lang="de-DE" dirty="0"/>
-              <a:t>z.B.: </a:t>
-            </a:r>
-            <a:r>
-              <a:rPr lang="en-US" dirty="0">
-                <a:latin typeface="Consolas" panose="020B0609020204030204" pitchFamily="49" charset="0"/>
-              </a:rPr>
-              <a:t>‘$(Configuration)’ == ‘DEBUG’</a:t>
-            </a:r>
-            <a:endParaRPr lang="de-DE" dirty="0">
-              <a:latin typeface="Consolas" panose="020B0609020204030204" pitchFamily="49" charset="0"/>
-            </a:endParaRPr>
-          </a:p>
-          <a:p>
-            <a:r>
-              <a:rPr lang="de-DE" dirty="0"/>
-              <a:t>Weitere Dokumentation unter: </a:t>
-            </a:r>
-            <a:r>
-              <a:rPr lang="de-DE" dirty="0">
-                <a:hlinkClick r:id="rId2"/>
-              </a:rPr>
-              <a:t>https://docs.microsoft.com/en-us/visualstudio/msbuild</a:t>
-            </a:r>
-            <a:endParaRPr lang="de-DE" dirty="0"/>
+              <a:t>Grundlagen – Live Demo</a:t>
+            </a:r>
           </a:p>
         </p:txBody>
       </p:sp>
@@ -21640,7 +21496,7 @@
           <p:cNvPr id="4" name="Date Placeholder 3">
             <a:extLst>
               <a:ext uri="{FF2B5EF4-FFF2-40B4-BE49-F238E27FC236}">
-                <a16:creationId xmlns:a16="http://schemas.microsoft.com/office/drawing/2014/main" id="{598E38B0-A03B-41EF-B0A9-92762A597D0C}"/>
+                <a16:creationId xmlns:a16="http://schemas.microsoft.com/office/drawing/2014/main" id="{8D163873-DB02-48E1-AF1D-9618B930B46F}"/>
               </a:ext>
             </a:extLst>
           </p:cNvPr>
@@ -21668,7 +21524,7 @@
           <p:cNvPr id="5" name="Footer Placeholder 4">
             <a:extLst>
               <a:ext uri="{FF2B5EF4-FFF2-40B4-BE49-F238E27FC236}">
-                <a16:creationId xmlns:a16="http://schemas.microsoft.com/office/drawing/2014/main" id="{3F63EDB1-531E-49C1-AA0C-6C2D600F2E8F}"/>
+                <a16:creationId xmlns:a16="http://schemas.microsoft.com/office/drawing/2014/main" id="{1CBCA056-A244-4D82-BE96-B5323D74A150}"/>
               </a:ext>
             </a:extLst>
           </p:cNvPr>
@@ -21696,7 +21552,7 @@
           <p:cNvPr id="6" name="Slide Number Placeholder 5">
             <a:extLst>
               <a:ext uri="{FF2B5EF4-FFF2-40B4-BE49-F238E27FC236}">
-                <a16:creationId xmlns:a16="http://schemas.microsoft.com/office/drawing/2014/main" id="{FF1C8C2E-F9FE-4D5E-A088-85ED1A5211FC}"/>
+                <a16:creationId xmlns:a16="http://schemas.microsoft.com/office/drawing/2014/main" id="{277FC5F9-1D73-4190-B79F-3C1BC6E87F44}"/>
               </a:ext>
             </a:extLst>
           </p:cNvPr>
@@ -21723,7 +21579,7 @@
     </p:spTree>
     <p:extLst>
       <p:ext uri="{BB962C8B-B14F-4D97-AF65-F5344CB8AC3E}">
-        <p14:creationId xmlns:p14="http://schemas.microsoft.com/office/powerpoint/2010/main" val="2146374302"/>
+        <p14:creationId xmlns:p14="http://schemas.microsoft.com/office/powerpoint/2010/main" val="2445126468"/>
       </p:ext>
     </p:extLst>
   </p:cSld>
@@ -21755,10 +21611,10 @@
       </p:grpSpPr>
       <p:sp>
         <p:nvSpPr>
-          <p:cNvPr id="2" name="Title 1">
-            <a:extLst>
-              <a:ext uri="{FF2B5EF4-FFF2-40B4-BE49-F238E27FC236}">
-                <a16:creationId xmlns:a16="http://schemas.microsoft.com/office/drawing/2014/main" id="{93718CAC-3145-48B8-B579-4FD22F45F889}"/>
+          <p:cNvPr id="7" name="Title 6">
+            <a:extLst>
+              <a:ext uri="{FF2B5EF4-FFF2-40B4-BE49-F238E27FC236}">
+                <a16:creationId xmlns:a16="http://schemas.microsoft.com/office/drawing/2014/main" id="{9716DFB7-64AC-4A61-A03F-4C7F577F3A0E}"/>
               </a:ext>
             </a:extLst>
           </p:cNvPr>
@@ -21776,25 +21632,25 @@
           <a:p>
             <a:r>
               <a:rPr lang="de-DE" dirty="0"/>
-              <a:t>Neuerung in </a:t>
+              <a:t>Grundlagen von </a:t>
             </a:r>
             <a:r>
               <a:rPr lang="de-DE" noProof="1"/>
-              <a:t>MSBuild</a:t>
+              <a:t>MSBuild </a:t>
             </a:r>
             <a:r>
               <a:rPr lang="de-DE" dirty="0"/>
-              <a:t> 15</a:t>
-            </a:r>
-          </a:p>
-        </p:txBody>
-      </p:sp>
-      <p:sp>
-        <p:nvSpPr>
-          <p:cNvPr id="3" name="Content Placeholder 2">
-            <a:extLst>
-              <a:ext uri="{FF2B5EF4-FFF2-40B4-BE49-F238E27FC236}">
-                <a16:creationId xmlns:a16="http://schemas.microsoft.com/office/drawing/2014/main" id="{7601CA0C-EFCC-4F74-83D9-4074495C22CB}"/>
+              <a:t>Projektdateien</a:t>
+            </a:r>
+          </a:p>
+        </p:txBody>
+      </p:sp>
+      <p:sp>
+        <p:nvSpPr>
+          <p:cNvPr id="8" name="Content Placeholder 7">
+            <a:extLst>
+              <a:ext uri="{FF2B5EF4-FFF2-40B4-BE49-F238E27FC236}">
+                <a16:creationId xmlns:a16="http://schemas.microsoft.com/office/drawing/2014/main" id="{BC451CD1-1559-459F-AE66-FD33E214B980}"/>
               </a:ext>
             </a:extLst>
           </p:cNvPr>
@@ -21802,7 +21658,7 @@
             <a:spLocks noGrp="1"/>
           </p:cNvSpPr>
           <p:nvPr>
-            <p:ph sz="half" idx="1"/>
+            <p:ph idx="1"/>
           </p:nvPr>
         </p:nvSpPr>
         <p:spPr/>
@@ -21811,88 +21667,172 @@
           <a:lstStyle/>
           <a:p>
             <a:r>
+              <a:rPr lang="de-DE" noProof="1"/>
+              <a:t>MSBuild</a:t>
+            </a:r>
+            <a:r>
               <a:rPr lang="de-DE" dirty="0"/>
-              <a:t>Aufgeräumter</a:t>
+              <a:t> Projektdateien sind deklarative XML-Dateien.</a:t>
             </a:r>
           </a:p>
           <a:p>
             <a:r>
               <a:rPr lang="de-DE" dirty="0"/>
-              <a:t>leichter händisch editierbar, direkt in VS</a:t>
-            </a:r>
-          </a:p>
-          <a:p>
+              <a:t>Das Wurzelelement ist muss &lt;</a:t>
+            </a:r>
+            <a:r>
+              <a:rPr lang="de-DE" dirty="0">
+                <a:latin typeface="Consolas" panose="020B0609020204030204" pitchFamily="49" charset="0"/>
+              </a:rPr>
+              <a:t>Project&gt;</a:t>
+            </a:r>
             <a:r>
               <a:rPr lang="de-DE" dirty="0"/>
-              <a:t>Mit </a:t>
-            </a:r>
-            <a:r>
-              <a:rPr lang="de-DE" noProof="1"/>
-              <a:t>&lt;</a:t>
-            </a:r>
+              <a:t> heißen.</a:t>
+            </a:r>
+          </a:p>
+          <a:p>
+            <a:r>
+              <a:rPr lang="de-DE" dirty="0"/>
+              <a:t>Darunter kann man folgende Kindelemente setzen:</a:t>
+            </a:r>
+          </a:p>
+          <a:p>
+            <a:pPr lvl="1"/>
+            <a:r>
+              <a:rPr lang="de-DE" dirty="0"/>
+              <a:t>Variablenansammlungen:</a:t>
+            </a:r>
+          </a:p>
+          <a:p>
+            <a:pPr lvl="2"/>
             <a:r>
               <a:rPr lang="de-DE" noProof="1">
                 <a:latin typeface="Consolas" panose="020B0609020204030204" pitchFamily="49" charset="0"/>
               </a:rPr>
-              <a:t>TargetFrameworks&gt;</a:t>
+              <a:t>&lt;PropertyGroup&gt;</a:t>
             </a:r>
             <a:r>
               <a:rPr lang="de-DE" dirty="0"/>
-              <a:t> kann von einem Projekt aus für mehrere Zielplattformen kompiliert werden</a:t>
-            </a:r>
-          </a:p>
-          <a:p>
+              <a:t> (Variablen mit selben Namen werden ersetzt)</a:t>
+            </a:r>
+          </a:p>
+          <a:p>
+            <a:pPr lvl="2"/>
+            <a:r>
+              <a:rPr lang="de-DE" noProof="1">
+                <a:latin typeface="Consolas" panose="020B0609020204030204" pitchFamily="49" charset="0"/>
+              </a:rPr>
+              <a:t>&lt;ItemGroup&gt;</a:t>
+            </a:r>
             <a:r>
               <a:rPr lang="de-DE" dirty="0"/>
-              <a:t>Keine Assembly-Attribute mehr notwendig (aber optional möglich)</a:t>
-            </a:r>
-          </a:p>
-          <a:p>
+              <a:t> (Variablen mit selben Namen werden in dieselbe Collection geschoben)</a:t>
+            </a:r>
+          </a:p>
+          <a:p>
+            <a:pPr lvl="1"/>
+            <a:r>
+              <a:rPr lang="de-DE" dirty="0">
+                <a:latin typeface="Consolas" panose="020B0609020204030204" pitchFamily="49" charset="0"/>
+              </a:rPr>
+              <a:t>&lt;Target&gt;</a:t>
+            </a:r>
             <a:r>
               <a:rPr lang="de-DE" dirty="0"/>
-              <a:t>NuGet-Paketinformationen können in Projektdatei eingebettet werden (sowohl zum Erstellen als auch zum Referenzieren)</a:t>
-            </a:r>
-          </a:p>
-        </p:txBody>
-      </p:sp>
-      <p:pic>
-        <p:nvPicPr>
-          <p:cNvPr id="8" name="Content Placeholder 7">
-            <a:extLst>
-              <a:ext uri="{FF2B5EF4-FFF2-40B4-BE49-F238E27FC236}">
-                <a16:creationId xmlns:a16="http://schemas.microsoft.com/office/drawing/2014/main" id="{B1CE2102-1EEF-4429-B89F-8149648BCE22}"/>
-              </a:ext>
-            </a:extLst>
-          </p:cNvPr>
-          <p:cNvPicPr>
-            <a:picLocks noGrp="1" noChangeAspect="1"/>
-          </p:cNvPicPr>
-          <p:nvPr>
-            <p:ph sz="half" idx="2"/>
-          </p:nvPr>
-        </p:nvPicPr>
-        <p:blipFill>
-          <a:blip r:embed="rId2"/>
-          <a:stretch>
-            <a:fillRect/>
-          </a:stretch>
-        </p:blipFill>
-        <p:spPr>
-          <a:xfrm>
-            <a:off x="6172200" y="1703747"/>
-            <a:ext cx="5181600" cy="3793406"/>
-          </a:xfrm>
-          <a:prstGeom prst="rect">
-            <a:avLst/>
-          </a:prstGeom>
-        </p:spPr>
-      </p:pic>
+              <a:t> (Kommandos, die ausgeführt werden von </a:t>
+            </a:r>
+            <a:r>
+              <a:rPr lang="de-DE" noProof="1"/>
+              <a:t>MSBuild</a:t>
+            </a:r>
+            <a:r>
+              <a:rPr lang="de-DE" dirty="0"/>
+              <a:t>)</a:t>
+            </a:r>
+          </a:p>
+          <a:p>
+            <a:pPr lvl="1"/>
+            <a:r>
+              <a:rPr lang="de-DE" dirty="0">
+                <a:latin typeface="Consolas" panose="020B0609020204030204" pitchFamily="49" charset="0"/>
+              </a:rPr>
+              <a:t>&lt;Import&gt;</a:t>
+            </a:r>
+            <a:r>
+              <a:rPr lang="de-DE" dirty="0"/>
+              <a:t> (Einbinden anderer </a:t>
+            </a:r>
+            <a:r>
+              <a:rPr lang="de-DE" noProof="1"/>
+              <a:t>MSBuild</a:t>
+            </a:r>
+            <a:r>
+              <a:rPr lang="de-DE" dirty="0"/>
+              <a:t> Projektdateien</a:t>
+            </a:r>
+          </a:p>
+          <a:p>
+            <a:r>
+              <a:rPr lang="de-DE" dirty="0"/>
+              <a:t>Auf jedem Element kann eine </a:t>
+            </a:r>
+            <a:r>
+              <a:rPr lang="de-DE" noProof="1">
+                <a:latin typeface="Consolas" panose="020B0609020204030204" pitchFamily="49" charset="0"/>
+              </a:rPr>
+              <a:t>&lt;Condition&gt;</a:t>
+            </a:r>
+            <a:r>
+              <a:rPr lang="de-DE" dirty="0"/>
+              <a:t> gesetzt werden. Sie entsprechen einer </a:t>
+            </a:r>
+            <a:r>
+              <a:rPr lang="de-DE" dirty="0" err="1"/>
+              <a:t>If</a:t>
+            </a:r>
+            <a:r>
+              <a:rPr lang="de-DE" dirty="0"/>
+              <a:t>-Abfrage und in ihnen werden üblicherweise bestimmte Variablenwerte geprüft.</a:t>
+            </a:r>
+            <a:br>
+              <a:rPr lang="de-DE" dirty="0"/>
+            </a:br>
+            <a:r>
+              <a:rPr lang="de-DE" dirty="0"/>
+              <a:t>z.B.: </a:t>
+            </a:r>
+            <a:r>
+              <a:rPr lang="en-US" dirty="0">
+                <a:latin typeface="Consolas" panose="020B0609020204030204" pitchFamily="49" charset="0"/>
+              </a:rPr>
+              <a:t>‘$(Configuration)’ == ‘DEBUG’</a:t>
+            </a:r>
+            <a:endParaRPr lang="de-DE" dirty="0">
+              <a:latin typeface="Consolas" panose="020B0609020204030204" pitchFamily="49" charset="0"/>
+            </a:endParaRPr>
+          </a:p>
+          <a:p>
+            <a:r>
+              <a:rPr lang="de-DE" dirty="0"/>
+              <a:t>Weitere Dokumentation unter: </a:t>
+            </a:r>
+            <a:r>
+              <a:rPr lang="de-DE" dirty="0">
+                <a:hlinkClick r:id="rId2"/>
+              </a:rPr>
+              <a:t>https://docs.microsoft.com/en-us/visualstudio/msbuild</a:t>
+            </a:r>
+            <a:endParaRPr lang="de-DE" dirty="0"/>
+          </a:p>
+        </p:txBody>
+      </p:sp>
       <p:sp>
         <p:nvSpPr>
           <p:cNvPr id="4" name="Date Placeholder 3">
             <a:extLst>
               <a:ext uri="{FF2B5EF4-FFF2-40B4-BE49-F238E27FC236}">
-                <a16:creationId xmlns:a16="http://schemas.microsoft.com/office/drawing/2014/main" id="{CB6B06C5-4868-457F-BA30-3BD04F423FC0}"/>
+                <a16:creationId xmlns:a16="http://schemas.microsoft.com/office/drawing/2014/main" id="{598E38B0-A03B-41EF-B0A9-92762A597D0C}"/>
               </a:ext>
             </a:extLst>
           </p:cNvPr>
@@ -21920,7 +21860,7 @@
           <p:cNvPr id="5" name="Footer Placeholder 4">
             <a:extLst>
               <a:ext uri="{FF2B5EF4-FFF2-40B4-BE49-F238E27FC236}">
-                <a16:creationId xmlns:a16="http://schemas.microsoft.com/office/drawing/2014/main" id="{C96C0488-0A8E-47D5-B6E2-145C7A87AC45}"/>
+                <a16:creationId xmlns:a16="http://schemas.microsoft.com/office/drawing/2014/main" id="{3F63EDB1-531E-49C1-AA0C-6C2D600F2E8F}"/>
               </a:ext>
             </a:extLst>
           </p:cNvPr>
@@ -21948,7 +21888,7 @@
           <p:cNvPr id="6" name="Slide Number Placeholder 5">
             <a:extLst>
               <a:ext uri="{FF2B5EF4-FFF2-40B4-BE49-F238E27FC236}">
-                <a16:creationId xmlns:a16="http://schemas.microsoft.com/office/drawing/2014/main" id="{D66D8875-2D1C-457C-A844-4588F5C18D4F}"/>
+                <a16:creationId xmlns:a16="http://schemas.microsoft.com/office/drawing/2014/main" id="{FF1C8C2E-F9FE-4D5E-A088-85ED1A5211FC}"/>
               </a:ext>
             </a:extLst>
           </p:cNvPr>
@@ -21975,7 +21915,7 @@
     </p:spTree>
     <p:extLst>
       <p:ext uri="{BB962C8B-B14F-4D97-AF65-F5344CB8AC3E}">
-        <p14:creationId xmlns:p14="http://schemas.microsoft.com/office/powerpoint/2010/main" val="4047367424"/>
+        <p14:creationId xmlns:p14="http://schemas.microsoft.com/office/powerpoint/2010/main" val="2146374302"/>
       </p:ext>
     </p:extLst>
   </p:cSld>
@@ -22010,7 +21950,7 @@
           <p:cNvPr id="2" name="Title 1">
             <a:extLst>
               <a:ext uri="{FF2B5EF4-FFF2-40B4-BE49-F238E27FC236}">
-                <a16:creationId xmlns:a16="http://schemas.microsoft.com/office/drawing/2014/main" id="{7615E46B-2D98-4F3D-A620-E589475AEE30}"/>
+                <a16:creationId xmlns:a16="http://schemas.microsoft.com/office/drawing/2014/main" id="{93718CAC-3145-48B8-B579-4FD22F45F889}"/>
               </a:ext>
             </a:extLst>
           </p:cNvPr>
@@ -22028,25 +21968,91 @@
           <a:p>
             <a:r>
               <a:rPr lang="de-DE" dirty="0"/>
-              <a:t>Noch mehr Zielplattformen: </a:t>
+              <a:t>Neuerung in </a:t>
             </a:r>
             <a:r>
               <a:rPr lang="de-DE" noProof="1"/>
-              <a:t>MSBuildSdkExtras</a:t>
+              <a:t>MSBuild</a:t>
             </a:r>
             <a:r>
               <a:rPr lang="de-DE" dirty="0"/>
-              <a:t> von Oren Novotny</a:t>
+              <a:t> 15</a:t>
+            </a:r>
+          </a:p>
+        </p:txBody>
+      </p:sp>
+      <p:sp>
+        <p:nvSpPr>
+          <p:cNvPr id="3" name="Content Placeholder 2">
+            <a:extLst>
+              <a:ext uri="{FF2B5EF4-FFF2-40B4-BE49-F238E27FC236}">
+                <a16:creationId xmlns:a16="http://schemas.microsoft.com/office/drawing/2014/main" id="{7601CA0C-EFCC-4F74-83D9-4074495C22CB}"/>
+              </a:ext>
+            </a:extLst>
+          </p:cNvPr>
+          <p:cNvSpPr>
+            <a:spLocks noGrp="1"/>
+          </p:cNvSpPr>
+          <p:nvPr>
+            <p:ph sz="half" idx="1"/>
+          </p:nvPr>
+        </p:nvSpPr>
+        <p:spPr/>
+        <p:txBody>
+          <a:bodyPr/>
+          <a:lstStyle/>
+          <a:p>
+            <a:r>
+              <a:rPr lang="de-DE" dirty="0"/>
+              <a:t>Aufgeräumter</a:t>
+            </a:r>
+          </a:p>
+          <a:p>
+            <a:r>
+              <a:rPr lang="de-DE" dirty="0"/>
+              <a:t>leichter händisch editierbar, direkt in VS</a:t>
+            </a:r>
+          </a:p>
+          <a:p>
+            <a:r>
+              <a:rPr lang="de-DE" dirty="0"/>
+              <a:t>Mit </a:t>
+            </a:r>
+            <a:r>
+              <a:rPr lang="de-DE" noProof="1"/>
+              <a:t>&lt;</a:t>
+            </a:r>
+            <a:r>
+              <a:rPr lang="de-DE" noProof="1">
+                <a:latin typeface="Consolas" panose="020B0609020204030204" pitchFamily="49" charset="0"/>
+              </a:rPr>
+              <a:t>TargetFrameworks&gt;</a:t>
+            </a:r>
+            <a:r>
+              <a:rPr lang="de-DE" dirty="0"/>
+              <a:t> kann von einem Projekt aus für mehrere Zielplattformen kompiliert werden</a:t>
+            </a:r>
+          </a:p>
+          <a:p>
+            <a:r>
+              <a:rPr lang="de-DE" dirty="0"/>
+              <a:t>Keine Assembly-Attribute mehr notwendig (aber optional möglich)</a:t>
+            </a:r>
+          </a:p>
+          <a:p>
+            <a:r>
+              <a:rPr lang="de-DE" dirty="0"/>
+              <a:t>NuGet-Paketinformationen können in Projektdatei eingebettet werden (sowohl zum Erstellen als auch zum Referenzieren)</a:t>
             </a:r>
           </a:p>
         </p:txBody>
       </p:sp>
       <p:pic>
         <p:nvPicPr>
-          <p:cNvPr id="21" name="Content Placeholder 20">
-            <a:extLst>
-              <a:ext uri="{FF2B5EF4-FFF2-40B4-BE49-F238E27FC236}">
-                <a16:creationId xmlns:a16="http://schemas.microsoft.com/office/drawing/2014/main" id="{1B19582B-828A-4749-9950-8EA7FB85E8EF}"/>
+          <p:cNvPr id="8" name="Content Placeholder 7">
+            <a:extLst>
+              <a:ext uri="{FF2B5EF4-FFF2-40B4-BE49-F238E27FC236}">
+                <a16:creationId xmlns:a16="http://schemas.microsoft.com/office/drawing/2014/main" id="{B1CE2102-1EEF-4429-B89F-8149648BCE22}"/>
               </a:ext>
             </a:extLst>
           </p:cNvPr>
@@ -22054,7 +22060,7 @@
             <a:picLocks noGrp="1" noChangeAspect="1"/>
           </p:cNvPicPr>
           <p:nvPr>
-            <p:ph sz="half" idx="1"/>
+            <p:ph sz="half" idx="2"/>
           </p:nvPr>
         </p:nvPicPr>
         <p:blipFill>
@@ -22065,8 +22071,8 @@
         </p:blipFill>
         <p:spPr>
           <a:xfrm>
-            <a:off x="838200" y="1117376"/>
-            <a:ext cx="5181600" cy="4966148"/>
+            <a:off x="6172200" y="1703747"/>
+            <a:ext cx="5181600" cy="3793406"/>
           </a:xfrm>
           <a:prstGeom prst="rect">
             <a:avLst/>
@@ -22075,10 +22081,10 @@
       </p:pic>
       <p:sp>
         <p:nvSpPr>
-          <p:cNvPr id="5" name="Date Placeholder 4">
-            <a:extLst>
-              <a:ext uri="{FF2B5EF4-FFF2-40B4-BE49-F238E27FC236}">
-                <a16:creationId xmlns:a16="http://schemas.microsoft.com/office/drawing/2014/main" id="{9EE11DEE-A82A-4241-85D7-11E365B144C2}"/>
+          <p:cNvPr id="4" name="Date Placeholder 3">
+            <a:extLst>
+              <a:ext uri="{FF2B5EF4-FFF2-40B4-BE49-F238E27FC236}">
+                <a16:creationId xmlns:a16="http://schemas.microsoft.com/office/drawing/2014/main" id="{CB6B06C5-4868-457F-BA30-3BD04F423FC0}"/>
               </a:ext>
             </a:extLst>
           </p:cNvPr>
@@ -22103,10 +22109,10 @@
       </p:sp>
       <p:sp>
         <p:nvSpPr>
-          <p:cNvPr id="6" name="Footer Placeholder 5">
-            <a:extLst>
-              <a:ext uri="{FF2B5EF4-FFF2-40B4-BE49-F238E27FC236}">
-                <a16:creationId xmlns:a16="http://schemas.microsoft.com/office/drawing/2014/main" id="{BD135E26-B193-4000-B463-E0A04F5961AA}"/>
+          <p:cNvPr id="5" name="Footer Placeholder 4">
+            <a:extLst>
+              <a:ext uri="{FF2B5EF4-FFF2-40B4-BE49-F238E27FC236}">
+                <a16:creationId xmlns:a16="http://schemas.microsoft.com/office/drawing/2014/main" id="{C96C0488-0A8E-47D5-B6E2-145C7A87AC45}"/>
               </a:ext>
             </a:extLst>
           </p:cNvPr>
@@ -22131,10 +22137,10 @@
       </p:sp>
       <p:sp>
         <p:nvSpPr>
-          <p:cNvPr id="7" name="Slide Number Placeholder 6">
-            <a:extLst>
-              <a:ext uri="{FF2B5EF4-FFF2-40B4-BE49-F238E27FC236}">
-                <a16:creationId xmlns:a16="http://schemas.microsoft.com/office/drawing/2014/main" id="{7DA684F8-970D-464F-B8C5-4202DDC7AB4A}"/>
+          <p:cNvPr id="6" name="Slide Number Placeholder 5">
+            <a:extLst>
+              <a:ext uri="{FF2B5EF4-FFF2-40B4-BE49-F238E27FC236}">
+                <a16:creationId xmlns:a16="http://schemas.microsoft.com/office/drawing/2014/main" id="{D66D8875-2D1C-457C-A844-4588F5C18D4F}"/>
               </a:ext>
             </a:extLst>
           </p:cNvPr>
@@ -22158,45 +22164,10 @@
           </a:p>
         </p:txBody>
       </p:sp>
-      <p:pic>
-        <p:nvPicPr>
-          <p:cNvPr id="20" name="Content Placeholder 19">
-            <a:extLst>
-              <a:ext uri="{FF2B5EF4-FFF2-40B4-BE49-F238E27FC236}">
-                <a16:creationId xmlns:a16="http://schemas.microsoft.com/office/drawing/2014/main" id="{EF1D6A0B-4A6D-4310-8FA8-4917FA855BD0}"/>
-              </a:ext>
-            </a:extLst>
-          </p:cNvPr>
-          <p:cNvPicPr>
-            <a:picLocks noGrp="1" noChangeAspect="1"/>
-          </p:cNvPicPr>
-          <p:nvPr>
-            <p:ph sz="half" idx="2"/>
-          </p:nvPr>
-        </p:nvPicPr>
-        <p:blipFill>
-          <a:blip r:embed="rId3">
-            <a:extLst>
-              <a:ext uri="{28A0092B-C50C-407E-A947-70E740481C1C}">
-                <a14:useLocalDpi xmlns:a14="http://schemas.microsoft.com/office/drawing/2010/main" val="0"/>
-              </a:ext>
-            </a:extLst>
-          </a:blip>
-          <a:stretch>
-            <a:fillRect/>
-          </a:stretch>
-        </p:blipFill>
-        <p:spPr>
-          <a:xfrm>
-            <a:off x="7281734" y="2119184"/>
-            <a:ext cx="2962532" cy="2962532"/>
-          </a:xfrm>
-        </p:spPr>
-      </p:pic>
     </p:spTree>
     <p:extLst>
       <p:ext uri="{BB962C8B-B14F-4D97-AF65-F5344CB8AC3E}">
-        <p14:creationId xmlns:p14="http://schemas.microsoft.com/office/powerpoint/2010/main" val="3242637928"/>
+        <p14:creationId xmlns:p14="http://schemas.microsoft.com/office/powerpoint/2010/main" val="4047367424"/>
       </p:ext>
     </p:extLst>
   </p:cSld>
@@ -22228,6 +22199,227 @@
       </p:grpSpPr>
       <p:sp>
         <p:nvSpPr>
+          <p:cNvPr id="2" name="Title 1">
+            <a:extLst>
+              <a:ext uri="{FF2B5EF4-FFF2-40B4-BE49-F238E27FC236}">
+                <a16:creationId xmlns:a16="http://schemas.microsoft.com/office/drawing/2014/main" id="{7615E46B-2D98-4F3D-A620-E589475AEE30}"/>
+              </a:ext>
+            </a:extLst>
+          </p:cNvPr>
+          <p:cNvSpPr>
+            <a:spLocks noGrp="1"/>
+          </p:cNvSpPr>
+          <p:nvPr>
+            <p:ph type="title"/>
+          </p:nvPr>
+        </p:nvSpPr>
+        <p:spPr/>
+        <p:txBody>
+          <a:bodyPr/>
+          <a:lstStyle/>
+          <a:p>
+            <a:r>
+              <a:rPr lang="de-DE" dirty="0"/>
+              <a:t>Noch mehr Zielplattformen: </a:t>
+            </a:r>
+            <a:r>
+              <a:rPr lang="de-DE" noProof="1"/>
+              <a:t>MSBuildSdkExtras</a:t>
+            </a:r>
+            <a:r>
+              <a:rPr lang="de-DE" dirty="0"/>
+              <a:t> von Oren Novotny</a:t>
+            </a:r>
+          </a:p>
+        </p:txBody>
+      </p:sp>
+      <p:pic>
+        <p:nvPicPr>
+          <p:cNvPr id="21" name="Content Placeholder 20">
+            <a:extLst>
+              <a:ext uri="{FF2B5EF4-FFF2-40B4-BE49-F238E27FC236}">
+                <a16:creationId xmlns:a16="http://schemas.microsoft.com/office/drawing/2014/main" id="{1B19582B-828A-4749-9950-8EA7FB85E8EF}"/>
+              </a:ext>
+            </a:extLst>
+          </p:cNvPr>
+          <p:cNvPicPr>
+            <a:picLocks noGrp="1" noChangeAspect="1"/>
+          </p:cNvPicPr>
+          <p:nvPr>
+            <p:ph sz="half" idx="1"/>
+          </p:nvPr>
+        </p:nvPicPr>
+        <p:blipFill>
+          <a:blip r:embed="rId2"/>
+          <a:stretch>
+            <a:fillRect/>
+          </a:stretch>
+        </p:blipFill>
+        <p:spPr>
+          <a:xfrm>
+            <a:off x="838200" y="1117376"/>
+            <a:ext cx="5181600" cy="4966148"/>
+          </a:xfrm>
+          <a:prstGeom prst="rect">
+            <a:avLst/>
+          </a:prstGeom>
+        </p:spPr>
+      </p:pic>
+      <p:sp>
+        <p:nvSpPr>
+          <p:cNvPr id="5" name="Date Placeholder 4">
+            <a:extLst>
+              <a:ext uri="{FF2B5EF4-FFF2-40B4-BE49-F238E27FC236}">
+                <a16:creationId xmlns:a16="http://schemas.microsoft.com/office/drawing/2014/main" id="{9EE11DEE-A82A-4241-85D7-11E365B144C2}"/>
+              </a:ext>
+            </a:extLst>
+          </p:cNvPr>
+          <p:cNvSpPr>
+            <a:spLocks noGrp="1"/>
+          </p:cNvSpPr>
+          <p:nvPr>
+            <p:ph type="dt" sz="half" idx="10"/>
+          </p:nvPr>
+        </p:nvSpPr>
+        <p:spPr/>
+        <p:txBody>
+          <a:bodyPr/>
+          <a:lstStyle/>
+          <a:p>
+            <a:r>
+              <a:rPr lang="de-DE"/>
+              <a:t>10.12.2018</a:t>
+            </a:r>
+          </a:p>
+        </p:txBody>
+      </p:sp>
+      <p:sp>
+        <p:nvSpPr>
+          <p:cNvPr id="6" name="Footer Placeholder 5">
+            <a:extLst>
+              <a:ext uri="{FF2B5EF4-FFF2-40B4-BE49-F238E27FC236}">
+                <a16:creationId xmlns:a16="http://schemas.microsoft.com/office/drawing/2014/main" id="{BD135E26-B193-4000-B463-E0A04F5961AA}"/>
+              </a:ext>
+            </a:extLst>
+          </p:cNvPr>
+          <p:cNvSpPr>
+            <a:spLocks noGrp="1"/>
+          </p:cNvSpPr>
+          <p:nvPr>
+            <p:ph type="ftr" sz="quarter" idx="11"/>
+          </p:nvPr>
+        </p:nvSpPr>
+        <p:spPr/>
+        <p:txBody>
+          <a:bodyPr/>
+          <a:lstStyle/>
+          <a:p>
+            <a:r>
+              <a:rPr lang="de-DE"/>
+              <a:t>Open Source mit .NET</a:t>
+            </a:r>
+          </a:p>
+        </p:txBody>
+      </p:sp>
+      <p:sp>
+        <p:nvSpPr>
+          <p:cNvPr id="7" name="Slide Number Placeholder 6">
+            <a:extLst>
+              <a:ext uri="{FF2B5EF4-FFF2-40B4-BE49-F238E27FC236}">
+                <a16:creationId xmlns:a16="http://schemas.microsoft.com/office/drawing/2014/main" id="{7DA684F8-970D-464F-B8C5-4202DDC7AB4A}"/>
+              </a:ext>
+            </a:extLst>
+          </p:cNvPr>
+          <p:cNvSpPr>
+            <a:spLocks noGrp="1"/>
+          </p:cNvSpPr>
+          <p:nvPr>
+            <p:ph type="sldNum" sz="quarter" idx="12"/>
+          </p:nvPr>
+        </p:nvSpPr>
+        <p:spPr/>
+        <p:txBody>
+          <a:bodyPr/>
+          <a:lstStyle/>
+          <a:p>
+            <a:fld id="{5A14344A-9BDE-4E14-9F68-42155428760A}" type="slidenum">
+              <a:rPr lang="de-DE" smtClean="0"/>
+              <a:t>34</a:t>
+            </a:fld>
+            <a:endParaRPr lang="de-DE"/>
+          </a:p>
+        </p:txBody>
+      </p:sp>
+      <p:pic>
+        <p:nvPicPr>
+          <p:cNvPr id="20" name="Content Placeholder 19">
+            <a:extLst>
+              <a:ext uri="{FF2B5EF4-FFF2-40B4-BE49-F238E27FC236}">
+                <a16:creationId xmlns:a16="http://schemas.microsoft.com/office/drawing/2014/main" id="{EF1D6A0B-4A6D-4310-8FA8-4917FA855BD0}"/>
+              </a:ext>
+            </a:extLst>
+          </p:cNvPr>
+          <p:cNvPicPr>
+            <a:picLocks noGrp="1" noChangeAspect="1"/>
+          </p:cNvPicPr>
+          <p:nvPr>
+            <p:ph sz="half" idx="2"/>
+          </p:nvPr>
+        </p:nvPicPr>
+        <p:blipFill>
+          <a:blip r:embed="rId3">
+            <a:extLst>
+              <a:ext uri="{28A0092B-C50C-407E-A947-70E740481C1C}">
+                <a14:useLocalDpi xmlns:a14="http://schemas.microsoft.com/office/drawing/2010/main" val="0"/>
+              </a:ext>
+            </a:extLst>
+          </a:blip>
+          <a:stretch>
+            <a:fillRect/>
+          </a:stretch>
+        </p:blipFill>
+        <p:spPr>
+          <a:xfrm>
+            <a:off x="7281734" y="2119184"/>
+            <a:ext cx="2962532" cy="2962532"/>
+          </a:xfrm>
+        </p:spPr>
+      </p:pic>
+    </p:spTree>
+    <p:extLst>
+      <p:ext uri="{BB962C8B-B14F-4D97-AF65-F5344CB8AC3E}">
+        <p14:creationId xmlns:p14="http://schemas.microsoft.com/office/powerpoint/2010/main" val="3242637928"/>
+      </p:ext>
+    </p:extLst>
+  </p:cSld>
+  <p:clrMapOvr>
+    <a:masterClrMapping/>
+  </p:clrMapOvr>
+  <p:transition spd="med">
+    <p:cover/>
+  </p:transition>
+</p:sld>
+</file>
+
+<file path=ppt/slides/slide35.xml><?xml version="1.0" encoding="utf-8"?>
+<p:sld xmlns:a="http://schemas.openxmlformats.org/drawingml/2006/main" xmlns:r="http://schemas.openxmlformats.org/officeDocument/2006/relationships" xmlns:p="http://schemas.openxmlformats.org/presentationml/2006/main">
+  <p:cSld>
+    <p:spTree>
+      <p:nvGrpSpPr>
+        <p:cNvPr id="1" name=""/>
+        <p:cNvGrpSpPr/>
+        <p:nvPr/>
+      </p:nvGrpSpPr>
+      <p:grpSpPr>
+        <a:xfrm>
+          <a:off x="0" y="0"/>
+          <a:ext cx="0" cy="0"/>
+          <a:chOff x="0" y="0"/>
+          <a:chExt cx="0" cy="0"/>
+        </a:xfrm>
+      </p:grpSpPr>
+      <p:sp>
+        <p:nvSpPr>
           <p:cNvPr id="8" name="Title 7">
             <a:extLst>
               <a:ext uri="{FF2B5EF4-FFF2-40B4-BE49-F238E27FC236}">
@@ -22452,7 +22644,7 @@
           <a:p>
             <a:fld id="{5A14344A-9BDE-4E14-9F68-42155428760A}" type="slidenum">
               <a:rPr lang="de-DE" smtClean="0"/>
-              <a:t>34</a:t>
+              <a:t>35</a:t>
             </a:fld>
             <a:endParaRPr lang="de-DE"/>
           </a:p>
@@ -22474,7 +22666,7 @@
 </p:sld>
 </file>
 
-<file path=ppt/slides/slide35.xml><?xml version="1.0" encoding="utf-8"?>
+<file path=ppt/slides/slide36.xml><?xml version="1.0" encoding="utf-8"?>
 <p:sld xmlns:a="http://schemas.openxmlformats.org/drawingml/2006/main" xmlns:r="http://schemas.openxmlformats.org/officeDocument/2006/relationships" xmlns:p="http://schemas.openxmlformats.org/presentationml/2006/main" showMasterPhAnim="0">
   <p:cSld>
     <p:spTree>
@@ -22626,7 +22818,7 @@
           <a:p>
             <a:fld id="{5A14344A-9BDE-4E14-9F68-42155428760A}" type="slidenum">
               <a:rPr lang="de-DE" smtClean="0"/>
-              <a:t>35</a:t>
+              <a:t>36</a:t>
             </a:fld>
             <a:endParaRPr lang="de-DE"/>
           </a:p>
@@ -22636,184 +22828,6 @@
     <p:extLst>
       <p:ext uri="{BB962C8B-B14F-4D97-AF65-F5344CB8AC3E}">
         <p14:creationId xmlns:p14="http://schemas.microsoft.com/office/powerpoint/2010/main" val="1712658223"/>
-      </p:ext>
-    </p:extLst>
-  </p:cSld>
-  <p:clrMapOvr>
-    <a:masterClrMapping/>
-  </p:clrMapOvr>
-  <p:transition spd="med">
-    <p:cover/>
-  </p:transition>
-</p:sld>
-</file>
-
-<file path=ppt/slides/slide36.xml><?xml version="1.0" encoding="utf-8"?>
-<p:sld xmlns:a="http://schemas.openxmlformats.org/drawingml/2006/main" xmlns:r="http://schemas.openxmlformats.org/officeDocument/2006/relationships" xmlns:p="http://schemas.openxmlformats.org/presentationml/2006/main">
-  <p:cSld>
-    <p:spTree>
-      <p:nvGrpSpPr>
-        <p:cNvPr id="1" name=""/>
-        <p:cNvGrpSpPr/>
-        <p:nvPr/>
-      </p:nvGrpSpPr>
-      <p:grpSpPr>
-        <a:xfrm>
-          <a:off x="0" y="0"/>
-          <a:ext cx="0" cy="0"/>
-          <a:chOff x="0" y="0"/>
-          <a:chExt cx="0" cy="0"/>
-        </a:xfrm>
-      </p:grpSpPr>
-      <p:sp>
-        <p:nvSpPr>
-          <p:cNvPr id="7" name="Title 6">
-            <a:extLst>
-              <a:ext uri="{FF2B5EF4-FFF2-40B4-BE49-F238E27FC236}">
-                <a16:creationId xmlns:a16="http://schemas.microsoft.com/office/drawing/2014/main" id="{B87706E8-2A30-4E53-AD94-1F27DA5B8264}"/>
-              </a:ext>
-            </a:extLst>
-          </p:cNvPr>
-          <p:cNvSpPr>
-            <a:spLocks noGrp="1"/>
-          </p:cNvSpPr>
-          <p:nvPr>
-            <p:ph type="title"/>
-          </p:nvPr>
-        </p:nvSpPr>
-        <p:spPr/>
-        <p:txBody>
-          <a:bodyPr/>
-          <a:lstStyle/>
-          <a:p>
-            <a:r>
-              <a:rPr lang="de-DE" dirty="0"/>
-              <a:t>Aufbau der .NET Compiler Plattform [5]</a:t>
-            </a:r>
-          </a:p>
-        </p:txBody>
-      </p:sp>
-      <p:pic>
-        <p:nvPicPr>
-          <p:cNvPr id="9" name="Content Placeholder 8">
-            <a:extLst>
-              <a:ext uri="{FF2B5EF4-FFF2-40B4-BE49-F238E27FC236}">
-                <a16:creationId xmlns:a16="http://schemas.microsoft.com/office/drawing/2014/main" id="{F5C05BA7-B82B-4D5B-B21D-9635B002EC9F}"/>
-              </a:ext>
-            </a:extLst>
-          </p:cNvPr>
-          <p:cNvPicPr>
-            <a:picLocks noGrp="1" noChangeAspect="1"/>
-          </p:cNvPicPr>
-          <p:nvPr>
-            <p:ph idx="1"/>
-          </p:nvPr>
-        </p:nvPicPr>
-        <p:blipFill>
-          <a:blip r:embed="rId2"/>
-          <a:stretch>
-            <a:fillRect/>
-          </a:stretch>
-        </p:blipFill>
-        <p:spPr>
-          <a:xfrm>
-            <a:off x="838200" y="944954"/>
-            <a:ext cx="10515600" cy="5310991"/>
-          </a:xfrm>
-          <a:prstGeom prst="rect">
-            <a:avLst/>
-          </a:prstGeom>
-        </p:spPr>
-      </p:pic>
-      <p:sp>
-        <p:nvSpPr>
-          <p:cNvPr id="4" name="Date Placeholder 3">
-            <a:extLst>
-              <a:ext uri="{FF2B5EF4-FFF2-40B4-BE49-F238E27FC236}">
-                <a16:creationId xmlns:a16="http://schemas.microsoft.com/office/drawing/2014/main" id="{5AAFD8F1-D5CA-4D26-BA6D-C980E840DA81}"/>
-              </a:ext>
-            </a:extLst>
-          </p:cNvPr>
-          <p:cNvSpPr>
-            <a:spLocks noGrp="1"/>
-          </p:cNvSpPr>
-          <p:nvPr>
-            <p:ph type="dt" sz="half" idx="10"/>
-          </p:nvPr>
-        </p:nvSpPr>
-        <p:spPr/>
-        <p:txBody>
-          <a:bodyPr/>
-          <a:lstStyle/>
-          <a:p>
-            <a:r>
-              <a:rPr lang="de-DE"/>
-              <a:t>10.12.2018</a:t>
-            </a:r>
-          </a:p>
-        </p:txBody>
-      </p:sp>
-      <p:sp>
-        <p:nvSpPr>
-          <p:cNvPr id="5" name="Footer Placeholder 4">
-            <a:extLst>
-              <a:ext uri="{FF2B5EF4-FFF2-40B4-BE49-F238E27FC236}">
-                <a16:creationId xmlns:a16="http://schemas.microsoft.com/office/drawing/2014/main" id="{33B0B0D3-B82C-4B56-8B4B-9C5A24915B20}"/>
-              </a:ext>
-            </a:extLst>
-          </p:cNvPr>
-          <p:cNvSpPr>
-            <a:spLocks noGrp="1"/>
-          </p:cNvSpPr>
-          <p:nvPr>
-            <p:ph type="ftr" sz="quarter" idx="11"/>
-          </p:nvPr>
-        </p:nvSpPr>
-        <p:spPr/>
-        <p:txBody>
-          <a:bodyPr/>
-          <a:lstStyle/>
-          <a:p>
-            <a:r>
-              <a:rPr lang="de-DE"/>
-              <a:t>Open Source mit .NET</a:t>
-            </a:r>
-          </a:p>
-        </p:txBody>
-      </p:sp>
-      <p:sp>
-        <p:nvSpPr>
-          <p:cNvPr id="6" name="Slide Number Placeholder 5">
-            <a:extLst>
-              <a:ext uri="{FF2B5EF4-FFF2-40B4-BE49-F238E27FC236}">
-                <a16:creationId xmlns:a16="http://schemas.microsoft.com/office/drawing/2014/main" id="{9E511C12-3B32-4298-BA0F-C349B0DD6701}"/>
-              </a:ext>
-            </a:extLst>
-          </p:cNvPr>
-          <p:cNvSpPr>
-            <a:spLocks noGrp="1"/>
-          </p:cNvSpPr>
-          <p:nvPr>
-            <p:ph type="sldNum" sz="quarter" idx="12"/>
-          </p:nvPr>
-        </p:nvSpPr>
-        <p:spPr/>
-        <p:txBody>
-          <a:bodyPr/>
-          <a:lstStyle/>
-          <a:p>
-            <a:fld id="{5A14344A-9BDE-4E14-9F68-42155428760A}" type="slidenum">
-              <a:rPr lang="de-DE" smtClean="0"/>
-              <a:t>36</a:t>
-            </a:fld>
-            <a:endParaRPr lang="de-DE"/>
-          </a:p>
-        </p:txBody>
-      </p:sp>
-    </p:spTree>
-    <p:extLst>
-      <p:ext uri="{BB962C8B-B14F-4D97-AF65-F5344CB8AC3E}">
-        <p14:creationId xmlns:p14="http://schemas.microsoft.com/office/powerpoint/2010/main" val="3502665349"/>
       </p:ext>
     </p:extLst>
   </p:cSld>
@@ -22845,10 +22859,10 @@
       </p:grpSpPr>
       <p:sp>
         <p:nvSpPr>
-          <p:cNvPr id="2" name="Title 1">
-            <a:extLst>
-              <a:ext uri="{FF2B5EF4-FFF2-40B4-BE49-F238E27FC236}">
-                <a16:creationId xmlns:a16="http://schemas.microsoft.com/office/drawing/2014/main" id="{043AD7DA-8127-4EA0-91A6-A71B829DBB62}"/>
+          <p:cNvPr id="7" name="Title 6">
+            <a:extLst>
+              <a:ext uri="{FF2B5EF4-FFF2-40B4-BE49-F238E27FC236}">
+                <a16:creationId xmlns:a16="http://schemas.microsoft.com/office/drawing/2014/main" id="{B87706E8-2A30-4E53-AD94-1F27DA5B8264}"/>
               </a:ext>
             </a:extLst>
           </p:cNvPr>
@@ -22866,114 +22880,49 @@
           <a:p>
             <a:r>
               <a:rPr lang="de-DE" dirty="0"/>
-              <a:t>Zusammenfassung</a:t>
-            </a:r>
-          </a:p>
-        </p:txBody>
-      </p:sp>
-      <p:sp>
-        <p:nvSpPr>
-          <p:cNvPr id="3" name="Content Placeholder 2">
-            <a:extLst>
-              <a:ext uri="{FF2B5EF4-FFF2-40B4-BE49-F238E27FC236}">
-                <a16:creationId xmlns:a16="http://schemas.microsoft.com/office/drawing/2014/main" id="{CA17E069-95E3-4EBF-A537-3EE52E36CA88}"/>
-              </a:ext>
-            </a:extLst>
-          </p:cNvPr>
-          <p:cNvSpPr>
-            <a:spLocks noGrp="1"/>
-          </p:cNvSpPr>
+              <a:t>Aufbau der .NET Compiler Plattform [5]</a:t>
+            </a:r>
+          </a:p>
+        </p:txBody>
+      </p:sp>
+      <p:pic>
+        <p:nvPicPr>
+          <p:cNvPr id="9" name="Content Placeholder 8">
+            <a:extLst>
+              <a:ext uri="{FF2B5EF4-FFF2-40B4-BE49-F238E27FC236}">
+                <a16:creationId xmlns:a16="http://schemas.microsoft.com/office/drawing/2014/main" id="{F5C05BA7-B82B-4D5B-B21D-9635B002EC9F}"/>
+              </a:ext>
+            </a:extLst>
+          </p:cNvPr>
+          <p:cNvPicPr>
+            <a:picLocks noGrp="1" noChangeAspect="1"/>
+          </p:cNvPicPr>
           <p:nvPr>
             <p:ph idx="1"/>
           </p:nvPr>
-        </p:nvSpPr>
-        <p:spPr/>
-        <p:txBody>
-          <a:bodyPr/>
-          <a:lstStyle/>
-          <a:p>
-            <a:r>
-              <a:rPr lang="de-DE" dirty="0"/>
-              <a:t>Zur Validierung von wiederkehrenden XML Kommentaren</a:t>
-            </a:r>
-          </a:p>
-          <a:p>
-            <a:r>
-              <a:rPr lang="de-DE" dirty="0"/>
-              <a:t>Für das Single-Source File </a:t>
-            </a:r>
-            <a:r>
-              <a:rPr lang="de-DE" dirty="0" err="1"/>
-              <a:t>Deployment</a:t>
-            </a:r>
-            <a:endParaRPr lang="de-DE" dirty="0"/>
-          </a:p>
-          <a:p>
-            <a:endParaRPr lang="de-DE" dirty="0"/>
-          </a:p>
-          <a:p>
-            <a:pPr marL="0" indent="0">
-              <a:buNone/>
-            </a:pPr>
-            <a:r>
-              <a:rPr lang="de-DE" dirty="0"/>
-              <a:t>Quellen:</a:t>
-            </a:r>
-          </a:p>
-          <a:p>
-            <a:pPr marL="0" indent="0">
-              <a:buNone/>
-            </a:pPr>
-            <a:r>
-              <a:rPr lang="de-DE" dirty="0"/>
-              <a:t>[5] - </a:t>
-            </a:r>
-            <a:r>
-              <a:rPr lang="de-DE" dirty="0">
-                <a:hlinkClick r:id="rId2"/>
-              </a:rPr>
-              <a:t>.NET Compiler </a:t>
-            </a:r>
-            <a:r>
-              <a:rPr lang="de-DE" dirty="0" err="1">
-                <a:hlinkClick r:id="rId2"/>
-              </a:rPr>
-              <a:t>Platform</a:t>
-            </a:r>
-            <a:r>
-              <a:rPr lang="de-DE" dirty="0">
-                <a:hlinkClick r:id="rId2"/>
-              </a:rPr>
-              <a:t> („</a:t>
-            </a:r>
-            <a:r>
-              <a:rPr lang="de-DE" dirty="0" err="1">
-                <a:hlinkClick r:id="rId2"/>
-              </a:rPr>
-              <a:t>Roslyn</a:t>
-            </a:r>
-            <a:r>
-              <a:rPr lang="de-DE" dirty="0">
-                <a:hlinkClick r:id="rId2"/>
-              </a:rPr>
-              <a:t>“) </a:t>
-            </a:r>
-            <a:r>
-              <a:rPr lang="de-DE" dirty="0" err="1">
-                <a:hlinkClick r:id="rId2"/>
-              </a:rPr>
-              <a:t>Overview</a:t>
-            </a:r>
-            <a:endParaRPr lang="de-DE" dirty="0"/>
-          </a:p>
-        </p:txBody>
-      </p:sp>
+        </p:nvPicPr>
+        <p:blipFill>
+          <a:blip r:embed="rId2"/>
+          <a:stretch>
+            <a:fillRect/>
+          </a:stretch>
+        </p:blipFill>
+        <p:spPr>
+          <a:xfrm>
+            <a:off x="838200" y="944954"/>
+            <a:ext cx="10515600" cy="5310991"/>
+          </a:xfrm>
+          <a:prstGeom prst="rect">
+            <a:avLst/>
+          </a:prstGeom>
+        </p:spPr>
+      </p:pic>
       <p:sp>
         <p:nvSpPr>
           <p:cNvPr id="4" name="Date Placeholder 3">
             <a:extLst>
               <a:ext uri="{FF2B5EF4-FFF2-40B4-BE49-F238E27FC236}">
-                <a16:creationId xmlns:a16="http://schemas.microsoft.com/office/drawing/2014/main" id="{8097102E-1312-4D37-AFF6-1549B92BAE5B}"/>
+                <a16:creationId xmlns:a16="http://schemas.microsoft.com/office/drawing/2014/main" id="{5AAFD8F1-D5CA-4D26-BA6D-C980E840DA81}"/>
               </a:ext>
             </a:extLst>
           </p:cNvPr>
@@ -23001,7 +22950,7 @@
           <p:cNvPr id="5" name="Footer Placeholder 4">
             <a:extLst>
               <a:ext uri="{FF2B5EF4-FFF2-40B4-BE49-F238E27FC236}">
-                <a16:creationId xmlns:a16="http://schemas.microsoft.com/office/drawing/2014/main" id="{35EF2965-7DC4-4E98-A57A-E8A708A897D7}"/>
+                <a16:creationId xmlns:a16="http://schemas.microsoft.com/office/drawing/2014/main" id="{33B0B0D3-B82C-4B56-8B4B-9C5A24915B20}"/>
               </a:ext>
             </a:extLst>
           </p:cNvPr>
@@ -23029,7 +22978,7 @@
           <p:cNvPr id="6" name="Slide Number Placeholder 5">
             <a:extLst>
               <a:ext uri="{FF2B5EF4-FFF2-40B4-BE49-F238E27FC236}">
-                <a16:creationId xmlns:a16="http://schemas.microsoft.com/office/drawing/2014/main" id="{FA115632-CB94-4321-BD81-AF2A4F680BD5}"/>
+                <a16:creationId xmlns:a16="http://schemas.microsoft.com/office/drawing/2014/main" id="{9E511C12-3B32-4298-BA0F-C349B0DD6701}"/>
               </a:ext>
             </a:extLst>
           </p:cNvPr>
@@ -23056,7 +23005,7 @@
     </p:spTree>
     <p:extLst>
       <p:ext uri="{BB962C8B-B14F-4D97-AF65-F5344CB8AC3E}">
-        <p14:creationId xmlns:p14="http://schemas.microsoft.com/office/powerpoint/2010/main" val="2245759213"/>
+        <p14:creationId xmlns:p14="http://schemas.microsoft.com/office/powerpoint/2010/main" val="3502665349"/>
       </p:ext>
     </p:extLst>
   </p:cSld>
@@ -23088,10 +23037,10 @@
       </p:grpSpPr>
       <p:sp>
         <p:nvSpPr>
-          <p:cNvPr id="7" name="Title 6">
-            <a:extLst>
-              <a:ext uri="{FF2B5EF4-FFF2-40B4-BE49-F238E27FC236}">
-                <a16:creationId xmlns:a16="http://schemas.microsoft.com/office/drawing/2014/main" id="{19CD3F92-5333-4C1C-9CCE-9F0C53462452}"/>
+          <p:cNvPr id="2" name="Title 1">
+            <a:extLst>
+              <a:ext uri="{FF2B5EF4-FFF2-40B4-BE49-F238E27FC236}">
+                <a16:creationId xmlns:a16="http://schemas.microsoft.com/office/drawing/2014/main" id="{043AD7DA-8127-4EA0-91A6-A71B829DBB62}"/>
               </a:ext>
             </a:extLst>
           </p:cNvPr>
@@ -23109,6 +23058,249 @@
           <a:p>
             <a:r>
               <a:rPr lang="de-DE" dirty="0"/>
+              <a:t>Zusammenfassung</a:t>
+            </a:r>
+          </a:p>
+        </p:txBody>
+      </p:sp>
+      <p:sp>
+        <p:nvSpPr>
+          <p:cNvPr id="3" name="Content Placeholder 2">
+            <a:extLst>
+              <a:ext uri="{FF2B5EF4-FFF2-40B4-BE49-F238E27FC236}">
+                <a16:creationId xmlns:a16="http://schemas.microsoft.com/office/drawing/2014/main" id="{CA17E069-95E3-4EBF-A537-3EE52E36CA88}"/>
+              </a:ext>
+            </a:extLst>
+          </p:cNvPr>
+          <p:cNvSpPr>
+            <a:spLocks noGrp="1"/>
+          </p:cNvSpPr>
+          <p:nvPr>
+            <p:ph idx="1"/>
+          </p:nvPr>
+        </p:nvSpPr>
+        <p:spPr/>
+        <p:txBody>
+          <a:bodyPr/>
+          <a:lstStyle/>
+          <a:p>
+            <a:r>
+              <a:rPr lang="de-DE" dirty="0"/>
+              <a:t>Zur Validierung von wiederkehrenden XML Kommentaren</a:t>
+            </a:r>
+          </a:p>
+          <a:p>
+            <a:r>
+              <a:rPr lang="de-DE" dirty="0"/>
+              <a:t>Für das Single-Source File </a:t>
+            </a:r>
+            <a:r>
+              <a:rPr lang="de-DE" dirty="0" err="1"/>
+              <a:t>Deployment</a:t>
+            </a:r>
+            <a:endParaRPr lang="de-DE" dirty="0"/>
+          </a:p>
+          <a:p>
+            <a:endParaRPr lang="de-DE" dirty="0"/>
+          </a:p>
+          <a:p>
+            <a:pPr marL="0" indent="0">
+              <a:buNone/>
+            </a:pPr>
+            <a:r>
+              <a:rPr lang="de-DE" dirty="0"/>
+              <a:t>Quellen:</a:t>
+            </a:r>
+          </a:p>
+          <a:p>
+            <a:pPr marL="0" indent="0">
+              <a:buNone/>
+            </a:pPr>
+            <a:r>
+              <a:rPr lang="de-DE" dirty="0"/>
+              <a:t>[5] - </a:t>
+            </a:r>
+            <a:r>
+              <a:rPr lang="de-DE" dirty="0">
+                <a:hlinkClick r:id="rId2"/>
+              </a:rPr>
+              <a:t>.NET Compiler </a:t>
+            </a:r>
+            <a:r>
+              <a:rPr lang="de-DE" dirty="0" err="1">
+                <a:hlinkClick r:id="rId2"/>
+              </a:rPr>
+              <a:t>Platform</a:t>
+            </a:r>
+            <a:r>
+              <a:rPr lang="de-DE" dirty="0">
+                <a:hlinkClick r:id="rId2"/>
+              </a:rPr>
+              <a:t> („</a:t>
+            </a:r>
+            <a:r>
+              <a:rPr lang="de-DE" dirty="0" err="1">
+                <a:hlinkClick r:id="rId2"/>
+              </a:rPr>
+              <a:t>Roslyn</a:t>
+            </a:r>
+            <a:r>
+              <a:rPr lang="de-DE" dirty="0">
+                <a:hlinkClick r:id="rId2"/>
+              </a:rPr>
+              <a:t>“) </a:t>
+            </a:r>
+            <a:r>
+              <a:rPr lang="de-DE" dirty="0" err="1">
+                <a:hlinkClick r:id="rId2"/>
+              </a:rPr>
+              <a:t>Overview</a:t>
+            </a:r>
+            <a:endParaRPr lang="de-DE" dirty="0"/>
+          </a:p>
+        </p:txBody>
+      </p:sp>
+      <p:sp>
+        <p:nvSpPr>
+          <p:cNvPr id="4" name="Date Placeholder 3">
+            <a:extLst>
+              <a:ext uri="{FF2B5EF4-FFF2-40B4-BE49-F238E27FC236}">
+                <a16:creationId xmlns:a16="http://schemas.microsoft.com/office/drawing/2014/main" id="{8097102E-1312-4D37-AFF6-1549B92BAE5B}"/>
+              </a:ext>
+            </a:extLst>
+          </p:cNvPr>
+          <p:cNvSpPr>
+            <a:spLocks noGrp="1"/>
+          </p:cNvSpPr>
+          <p:nvPr>
+            <p:ph type="dt" sz="half" idx="10"/>
+          </p:nvPr>
+        </p:nvSpPr>
+        <p:spPr/>
+        <p:txBody>
+          <a:bodyPr/>
+          <a:lstStyle/>
+          <a:p>
+            <a:r>
+              <a:rPr lang="de-DE"/>
+              <a:t>10.12.2018</a:t>
+            </a:r>
+          </a:p>
+        </p:txBody>
+      </p:sp>
+      <p:sp>
+        <p:nvSpPr>
+          <p:cNvPr id="5" name="Footer Placeholder 4">
+            <a:extLst>
+              <a:ext uri="{FF2B5EF4-FFF2-40B4-BE49-F238E27FC236}">
+                <a16:creationId xmlns:a16="http://schemas.microsoft.com/office/drawing/2014/main" id="{35EF2965-7DC4-4E98-A57A-E8A708A897D7}"/>
+              </a:ext>
+            </a:extLst>
+          </p:cNvPr>
+          <p:cNvSpPr>
+            <a:spLocks noGrp="1"/>
+          </p:cNvSpPr>
+          <p:nvPr>
+            <p:ph type="ftr" sz="quarter" idx="11"/>
+          </p:nvPr>
+        </p:nvSpPr>
+        <p:spPr/>
+        <p:txBody>
+          <a:bodyPr/>
+          <a:lstStyle/>
+          <a:p>
+            <a:r>
+              <a:rPr lang="de-DE"/>
+              <a:t>Open Source mit .NET</a:t>
+            </a:r>
+          </a:p>
+        </p:txBody>
+      </p:sp>
+      <p:sp>
+        <p:nvSpPr>
+          <p:cNvPr id="6" name="Slide Number Placeholder 5">
+            <a:extLst>
+              <a:ext uri="{FF2B5EF4-FFF2-40B4-BE49-F238E27FC236}">
+                <a16:creationId xmlns:a16="http://schemas.microsoft.com/office/drawing/2014/main" id="{FA115632-CB94-4321-BD81-AF2A4F680BD5}"/>
+              </a:ext>
+            </a:extLst>
+          </p:cNvPr>
+          <p:cNvSpPr>
+            <a:spLocks noGrp="1"/>
+          </p:cNvSpPr>
+          <p:nvPr>
+            <p:ph type="sldNum" sz="quarter" idx="12"/>
+          </p:nvPr>
+        </p:nvSpPr>
+        <p:spPr/>
+        <p:txBody>
+          <a:bodyPr/>
+          <a:lstStyle/>
+          <a:p>
+            <a:fld id="{5A14344A-9BDE-4E14-9F68-42155428760A}" type="slidenum">
+              <a:rPr lang="de-DE" smtClean="0"/>
+              <a:t>38</a:t>
+            </a:fld>
+            <a:endParaRPr lang="de-DE"/>
+          </a:p>
+        </p:txBody>
+      </p:sp>
+    </p:spTree>
+    <p:extLst>
+      <p:ext uri="{BB962C8B-B14F-4D97-AF65-F5344CB8AC3E}">
+        <p14:creationId xmlns:p14="http://schemas.microsoft.com/office/powerpoint/2010/main" val="2245759213"/>
+      </p:ext>
+    </p:extLst>
+  </p:cSld>
+  <p:clrMapOvr>
+    <a:masterClrMapping/>
+  </p:clrMapOvr>
+  <p:transition spd="med">
+    <p:cover/>
+  </p:transition>
+</p:sld>
+</file>
+
+<file path=ppt/slides/slide39.xml><?xml version="1.0" encoding="utf-8"?>
+<p:sld xmlns:a="http://schemas.openxmlformats.org/drawingml/2006/main" xmlns:r="http://schemas.openxmlformats.org/officeDocument/2006/relationships" xmlns:p="http://schemas.openxmlformats.org/presentationml/2006/main">
+  <p:cSld>
+    <p:spTree>
+      <p:nvGrpSpPr>
+        <p:cNvPr id="1" name=""/>
+        <p:cNvGrpSpPr/>
+        <p:nvPr/>
+      </p:nvGrpSpPr>
+      <p:grpSpPr>
+        <a:xfrm>
+          <a:off x="0" y="0"/>
+          <a:ext cx="0" cy="0"/>
+          <a:chOff x="0" y="0"/>
+          <a:chExt cx="0" cy="0"/>
+        </a:xfrm>
+      </p:grpSpPr>
+      <p:sp>
+        <p:nvSpPr>
+          <p:cNvPr id="7" name="Title 6">
+            <a:extLst>
+              <a:ext uri="{FF2B5EF4-FFF2-40B4-BE49-F238E27FC236}">
+                <a16:creationId xmlns:a16="http://schemas.microsoft.com/office/drawing/2014/main" id="{19CD3F92-5333-4C1C-9CCE-9F0C53462452}"/>
+              </a:ext>
+            </a:extLst>
+          </p:cNvPr>
+          <p:cNvSpPr>
+            <a:spLocks noGrp="1"/>
+          </p:cNvSpPr>
+          <p:nvPr>
+            <p:ph type="title"/>
+          </p:nvPr>
+        </p:nvSpPr>
+        <p:spPr/>
+        <p:txBody>
+          <a:bodyPr/>
+          <a:lstStyle/>
+          <a:p>
+            <a:r>
+              <a:rPr lang="de-DE" dirty="0"/>
               <a:t>Vielen Dank für die Aufmerksamkeit</a:t>
             </a:r>
           </a:p>
@@ -23227,7 +23419,7 @@
           <a:p>
             <a:fld id="{5A14344A-9BDE-4E14-9F68-42155428760A}" type="slidenum">
               <a:rPr lang="de-DE" smtClean="0"/>
-              <a:t>38</a:t>
+              <a:t>39</a:t>
             </a:fld>
             <a:endParaRPr lang="de-DE"/>
           </a:p>

</xml_diff>